<commit_message>
Adding images from R statistics, updated powerpoint and R file
</commit_message>
<xml_diff>
--- a/FinalCapstonePP.pptx
+++ b/FinalCapstonePP.pptx
@@ -22,16 +22,26 @@
     <p:sldId id="266" r:id="rId17"/>
     <p:sldId id="267" r:id="rId18"/>
     <p:sldId id="268" r:id="rId19"/>
+    <p:sldId id="269" r:id="rId20"/>
+    <p:sldId id="270" r:id="rId21"/>
+    <p:sldId id="271" r:id="rId22"/>
   </p:sldIdLst>
   <p:sldSz cy="5143500" cx="9144000"/>
   <p:notesSz cx="6858000" cy="9144000"/>
   <p:embeddedFontLst>
     <p:embeddedFont>
       <p:font typeface="Open Sans Light"/>
-      <p:regular r:id="rId20"/>
-      <p:bold r:id="rId21"/>
-      <p:italic r:id="rId22"/>
-      <p:boldItalic r:id="rId23"/>
+      <p:regular r:id="rId23"/>
+      <p:bold r:id="rId24"/>
+      <p:italic r:id="rId25"/>
+      <p:boldItalic r:id="rId26"/>
+    </p:embeddedFont>
+    <p:embeddedFont>
+      <p:font typeface="Open Sans"/>
+      <p:regular r:id="rId27"/>
+      <p:bold r:id="rId28"/>
+      <p:italic r:id="rId29"/>
+      <p:boldItalic r:id="rId30"/>
     </p:embeddedFont>
   </p:embeddedFontLst>
   <p:defaultTextStyle>
@@ -826,7 +836,7 @@
       </p:grpSpPr>
       <p:sp>
         <p:nvSpPr>
-          <p:cNvPr id="185" name="Google Shape;185;g23a50b07eb6_2_111:notes"/>
+          <p:cNvPr id="185" name="Google Shape;185;g23a50b07eb6_2_101:notes"/>
           <p:cNvSpPr txBox="1"/>
           <p:nvPr>
             <p:ph idx="1" type="body"/>
@@ -865,7 +875,7 @@
       </p:sp>
       <p:sp>
         <p:nvSpPr>
-          <p:cNvPr id="186" name="Google Shape;186;g23a50b07eb6_2_111:notes"/>
+          <p:cNvPr id="186" name="Google Shape;186;g23a50b07eb6_2_101:notes"/>
           <p:cNvSpPr/>
           <p:nvPr>
             <p:ph idx="2" type="sldImg"/>
@@ -911,7 +921,7 @@
   <p:cSld>
     <p:spTree>
       <p:nvGrpSpPr>
-        <p:cNvPr id="190" name="Shape 190"/>
+        <p:cNvPr id="191" name="Shape 191"/>
         <p:cNvGrpSpPr/>
         <p:nvPr/>
       </p:nvGrpSpPr>
@@ -925,7 +935,42 @@
       </p:grpSpPr>
       <p:sp>
         <p:nvSpPr>
-          <p:cNvPr id="191" name="Google Shape;191;g23a50b07eb6_2_116:notes"/>
+          <p:cNvPr id="192" name="Google Shape;192;g23a9732df77_0_3:notes"/>
+          <p:cNvSpPr/>
+          <p:nvPr>
+            <p:ph idx="2" type="sldImg"/>
+          </p:nvPr>
+        </p:nvSpPr>
+        <p:spPr>
+          <a:xfrm>
+            <a:off x="381300" y="685800"/>
+            <a:ext cx="6096000" cy="3429000"/>
+          </a:xfrm>
+          <a:custGeom>
+            <a:rect b="b" l="l" r="r" t="t"/>
+            <a:pathLst>
+              <a:path extrusionOk="0" h="120000" w="120000">
+                <a:moveTo>
+                  <a:pt x="0" y="0"/>
+                </a:moveTo>
+                <a:lnTo>
+                  <a:pt x="120000" y="0"/>
+                </a:lnTo>
+                <a:lnTo>
+                  <a:pt x="120000" y="120000"/>
+                </a:lnTo>
+                <a:lnTo>
+                  <a:pt x="0" y="120000"/>
+                </a:lnTo>
+                <a:close/>
+              </a:path>
+            </a:pathLst>
+          </a:custGeom>
+        </p:spPr>
+      </p:sp>
+      <p:sp>
+        <p:nvSpPr>
+          <p:cNvPr id="193" name="Google Shape;193;g23a9732df77_0_3:notes"/>
           <p:cNvSpPr txBox="1"/>
           <p:nvPr>
             <p:ph idx="1" type="body"/>
@@ -962,9 +1007,271 @@
           </a:p>
         </p:txBody>
       </p:sp>
+    </p:spTree>
+  </p:cSld>
+  <p:clrMapOvr>
+    <a:masterClrMapping/>
+  </p:clrMapOvr>
+</p:notes>
+</file>
+
+<file path=ppt/notesSlides/notesSlide12.xml><?xml version="1.0" encoding="utf-8"?>
+<p:notes xmlns:a="http://schemas.openxmlformats.org/drawingml/2006/main" xmlns:r="http://schemas.openxmlformats.org/officeDocument/2006/relationships" xmlns:mc="http://schemas.openxmlformats.org/markup-compatibility/2006" xmlns:mv="urn:schemas-microsoft-com:mac:vml" xmlns:p="http://schemas.openxmlformats.org/presentationml/2006/main" xmlns:c="http://schemas.openxmlformats.org/drawingml/2006/chart" xmlns:dgm="http://schemas.openxmlformats.org/drawingml/2006/diagram" xmlns:o="urn:schemas-microsoft-com:office:office" xmlns:v="urn:schemas-microsoft-com:vml" xmlns:pvml="urn:schemas-microsoft-com:office:powerpoint" xmlns:com="http://schemas.openxmlformats.org/drawingml/2006/compatibility" xmlns:p14="http://schemas.microsoft.com/office/powerpoint/2010/main" xmlns:p15="http://schemas.microsoft.com/office/powerpoint/2012/main" xmlns:ahyp="http://schemas.microsoft.com/office/drawing/2018/hyperlinkcolor" showMasterPhAnim="0" showMasterSp="0">
+  <p:cSld>
+    <p:spTree>
+      <p:nvGrpSpPr>
+        <p:cNvPr id="199" name="Shape 199"/>
+        <p:cNvGrpSpPr/>
+        <p:nvPr/>
+      </p:nvGrpSpPr>
+      <p:grpSpPr>
+        <a:xfrm>
+          <a:off x="0" y="0"/>
+          <a:ext cx="0" cy="0"/>
+          <a:chOff x="0" y="0"/>
+          <a:chExt cx="0" cy="0"/>
+        </a:xfrm>
+      </p:grpSpPr>
       <p:sp>
         <p:nvSpPr>
-          <p:cNvPr id="192" name="Google Shape;192;g23a50b07eb6_2_116:notes"/>
+          <p:cNvPr id="200" name="Google Shape;200;g23a9732df77_0_10:notes"/>
+          <p:cNvSpPr/>
+          <p:nvPr>
+            <p:ph idx="2" type="sldImg"/>
+          </p:nvPr>
+        </p:nvSpPr>
+        <p:spPr>
+          <a:xfrm>
+            <a:off x="381300" y="685800"/>
+            <a:ext cx="6096000" cy="3429000"/>
+          </a:xfrm>
+          <a:custGeom>
+            <a:rect b="b" l="l" r="r" t="t"/>
+            <a:pathLst>
+              <a:path extrusionOk="0" h="120000" w="120000">
+                <a:moveTo>
+                  <a:pt x="0" y="0"/>
+                </a:moveTo>
+                <a:lnTo>
+                  <a:pt x="120000" y="0"/>
+                </a:lnTo>
+                <a:lnTo>
+                  <a:pt x="120000" y="120000"/>
+                </a:lnTo>
+                <a:lnTo>
+                  <a:pt x="0" y="120000"/>
+                </a:lnTo>
+                <a:close/>
+              </a:path>
+            </a:pathLst>
+          </a:custGeom>
+        </p:spPr>
+      </p:sp>
+      <p:sp>
+        <p:nvSpPr>
+          <p:cNvPr id="201" name="Google Shape;201;g23a9732df77_0_10:notes"/>
+          <p:cNvSpPr txBox="1"/>
+          <p:nvPr>
+            <p:ph idx="1" type="body"/>
+          </p:nvPr>
+        </p:nvSpPr>
+        <p:spPr>
+          <a:xfrm>
+            <a:off x="685800" y="4343400"/>
+            <a:ext cx="5486400" cy="4114800"/>
+          </a:xfrm>
+          <a:prstGeom prst="rect">
+            <a:avLst/>
+          </a:prstGeom>
+        </p:spPr>
+        <p:txBody>
+          <a:bodyPr anchorCtr="0" anchor="t" bIns="91425" lIns="91425" spcFirstLastPara="1" rIns="91425" wrap="square" tIns="91425">
+            <a:noAutofit/>
+          </a:bodyPr>
+          <a:lstStyle/>
+          <a:p>
+            <a:pPr indent="0" lvl="0" marL="0" rtl="0" algn="l">
+              <a:spcBef>
+                <a:spcPts val="0"/>
+              </a:spcBef>
+              <a:spcAft>
+                <a:spcPts val="0"/>
+              </a:spcAft>
+              <a:buNone/>
+            </a:pPr>
+            <a:r>
+              <a:t/>
+            </a:r>
+            <a:endParaRPr/>
+          </a:p>
+        </p:txBody>
+      </p:sp>
+    </p:spTree>
+  </p:cSld>
+  <p:clrMapOvr>
+    <a:masterClrMapping/>
+  </p:clrMapOvr>
+</p:notes>
+</file>
+
+<file path=ppt/notesSlides/notesSlide13.xml><?xml version="1.0" encoding="utf-8"?>
+<p:notes xmlns:a="http://schemas.openxmlformats.org/drawingml/2006/main" xmlns:r="http://schemas.openxmlformats.org/officeDocument/2006/relationships" xmlns:mc="http://schemas.openxmlformats.org/markup-compatibility/2006" xmlns:mv="urn:schemas-microsoft-com:mac:vml" xmlns:p="http://schemas.openxmlformats.org/presentationml/2006/main" xmlns:c="http://schemas.openxmlformats.org/drawingml/2006/chart" xmlns:dgm="http://schemas.openxmlformats.org/drawingml/2006/diagram" xmlns:o="urn:schemas-microsoft-com:office:office" xmlns:v="urn:schemas-microsoft-com:vml" xmlns:pvml="urn:schemas-microsoft-com:office:powerpoint" xmlns:com="http://schemas.openxmlformats.org/drawingml/2006/compatibility" xmlns:p14="http://schemas.microsoft.com/office/powerpoint/2010/main" xmlns:p15="http://schemas.microsoft.com/office/powerpoint/2012/main" xmlns:ahyp="http://schemas.microsoft.com/office/drawing/2018/hyperlinkcolor" showMasterPhAnim="0" showMasterSp="0">
+  <p:cSld>
+    <p:spTree>
+      <p:nvGrpSpPr>
+        <p:cNvPr id="205" name="Shape 205"/>
+        <p:cNvGrpSpPr/>
+        <p:nvPr/>
+      </p:nvGrpSpPr>
+      <p:grpSpPr>
+        <a:xfrm>
+          <a:off x="0" y="0"/>
+          <a:ext cx="0" cy="0"/>
+          <a:chOff x="0" y="0"/>
+          <a:chExt cx="0" cy="0"/>
+        </a:xfrm>
+      </p:grpSpPr>
+      <p:sp>
+        <p:nvSpPr>
+          <p:cNvPr id="206" name="Google Shape;206;g23a9732df77_0_17:notes"/>
+          <p:cNvSpPr/>
+          <p:nvPr>
+            <p:ph idx="2" type="sldImg"/>
+          </p:nvPr>
+        </p:nvSpPr>
+        <p:spPr>
+          <a:xfrm>
+            <a:off x="381300" y="685800"/>
+            <a:ext cx="6096000" cy="3429000"/>
+          </a:xfrm>
+          <a:custGeom>
+            <a:rect b="b" l="l" r="r" t="t"/>
+            <a:pathLst>
+              <a:path extrusionOk="0" h="120000" w="120000">
+                <a:moveTo>
+                  <a:pt x="0" y="0"/>
+                </a:moveTo>
+                <a:lnTo>
+                  <a:pt x="120000" y="0"/>
+                </a:lnTo>
+                <a:lnTo>
+                  <a:pt x="120000" y="120000"/>
+                </a:lnTo>
+                <a:lnTo>
+                  <a:pt x="0" y="120000"/>
+                </a:lnTo>
+                <a:close/>
+              </a:path>
+            </a:pathLst>
+          </a:custGeom>
+        </p:spPr>
+      </p:sp>
+      <p:sp>
+        <p:nvSpPr>
+          <p:cNvPr id="207" name="Google Shape;207;g23a9732df77_0_17:notes"/>
+          <p:cNvSpPr txBox="1"/>
+          <p:nvPr>
+            <p:ph idx="1" type="body"/>
+          </p:nvPr>
+        </p:nvSpPr>
+        <p:spPr>
+          <a:xfrm>
+            <a:off x="685800" y="4343400"/>
+            <a:ext cx="5486400" cy="4114800"/>
+          </a:xfrm>
+          <a:prstGeom prst="rect">
+            <a:avLst/>
+          </a:prstGeom>
+        </p:spPr>
+        <p:txBody>
+          <a:bodyPr anchorCtr="0" anchor="t" bIns="91425" lIns="91425" spcFirstLastPara="1" rIns="91425" wrap="square" tIns="91425">
+            <a:noAutofit/>
+          </a:bodyPr>
+          <a:lstStyle/>
+          <a:p>
+            <a:pPr indent="0" lvl="0" marL="0" rtl="0" algn="l">
+              <a:spcBef>
+                <a:spcPts val="0"/>
+              </a:spcBef>
+              <a:spcAft>
+                <a:spcPts val="0"/>
+              </a:spcAft>
+              <a:buNone/>
+            </a:pPr>
+            <a:r>
+              <a:t/>
+            </a:r>
+            <a:endParaRPr/>
+          </a:p>
+        </p:txBody>
+      </p:sp>
+    </p:spTree>
+  </p:cSld>
+  <p:clrMapOvr>
+    <a:masterClrMapping/>
+  </p:clrMapOvr>
+</p:notes>
+</file>
+
+<file path=ppt/notesSlides/notesSlide14.xml><?xml version="1.0" encoding="utf-8"?>
+<p:notes xmlns:a="http://schemas.openxmlformats.org/drawingml/2006/main" xmlns:r="http://schemas.openxmlformats.org/officeDocument/2006/relationships" xmlns:mc="http://schemas.openxmlformats.org/markup-compatibility/2006" xmlns:mv="urn:schemas-microsoft-com:mac:vml" xmlns:p="http://schemas.openxmlformats.org/presentationml/2006/main" xmlns:c="http://schemas.openxmlformats.org/drawingml/2006/chart" xmlns:dgm="http://schemas.openxmlformats.org/drawingml/2006/diagram" xmlns:o="urn:schemas-microsoft-com:office:office" xmlns:v="urn:schemas-microsoft-com:vml" xmlns:pvml="urn:schemas-microsoft-com:office:powerpoint" xmlns:com="http://schemas.openxmlformats.org/drawingml/2006/compatibility" xmlns:p14="http://schemas.microsoft.com/office/powerpoint/2010/main" xmlns:p15="http://schemas.microsoft.com/office/powerpoint/2012/main" xmlns:ahyp="http://schemas.microsoft.com/office/drawing/2018/hyperlinkcolor" showMasterPhAnim="0" showMasterSp="0">
+  <p:cSld>
+    <p:spTree>
+      <p:nvGrpSpPr>
+        <p:cNvPr id="212" name="Shape 212"/>
+        <p:cNvGrpSpPr/>
+        <p:nvPr/>
+      </p:nvGrpSpPr>
+      <p:grpSpPr>
+        <a:xfrm>
+          <a:off x="0" y="0"/>
+          <a:ext cx="0" cy="0"/>
+          <a:chOff x="0" y="0"/>
+          <a:chExt cx="0" cy="0"/>
+        </a:xfrm>
+      </p:grpSpPr>
+      <p:sp>
+        <p:nvSpPr>
+          <p:cNvPr id="213" name="Google Shape;213;g23a50b07eb6_2_116:notes"/>
+          <p:cNvSpPr txBox="1"/>
+          <p:nvPr>
+            <p:ph idx="1" type="body"/>
+          </p:nvPr>
+        </p:nvSpPr>
+        <p:spPr>
+          <a:xfrm>
+            <a:off x="685800" y="4343400"/>
+            <a:ext cx="5486400" cy="4114800"/>
+          </a:xfrm>
+          <a:prstGeom prst="rect">
+            <a:avLst/>
+          </a:prstGeom>
+        </p:spPr>
+        <p:txBody>
+          <a:bodyPr anchorCtr="0" anchor="t" bIns="91425" lIns="91425" spcFirstLastPara="1" rIns="91425" wrap="square" tIns="91425">
+            <a:noAutofit/>
+          </a:bodyPr>
+          <a:lstStyle/>
+          <a:p>
+            <a:pPr indent="0" lvl="0" marL="0" rtl="0" algn="l">
+              <a:spcBef>
+                <a:spcPts val="0"/>
+              </a:spcBef>
+              <a:spcAft>
+                <a:spcPts val="0"/>
+              </a:spcAft>
+              <a:buNone/>
+            </a:pPr>
+            <a:r>
+              <a:t/>
+            </a:r>
+            <a:endParaRPr/>
+          </a:p>
+        </p:txBody>
+      </p:sp>
+      <p:sp>
+        <p:nvSpPr>
+          <p:cNvPr id="214" name="Google Shape;214;g23a50b07eb6_2_116:notes"/>
           <p:cNvSpPr/>
           <p:nvPr>
             <p:ph idx="2" type="sldImg"/>
@@ -1005,12 +1312,12 @@
 </p:notes>
 </file>
 
-<file path=ppt/notesSlides/notesSlide12.xml><?xml version="1.0" encoding="utf-8"?>
+<file path=ppt/notesSlides/notesSlide15.xml><?xml version="1.0" encoding="utf-8"?>
 <p:notes xmlns:a="http://schemas.openxmlformats.org/drawingml/2006/main" xmlns:r="http://schemas.openxmlformats.org/officeDocument/2006/relationships" xmlns:mc="http://schemas.openxmlformats.org/markup-compatibility/2006" xmlns:mv="urn:schemas-microsoft-com:mac:vml" xmlns:p="http://schemas.openxmlformats.org/presentationml/2006/main" xmlns:c="http://schemas.openxmlformats.org/drawingml/2006/chart" xmlns:dgm="http://schemas.openxmlformats.org/drawingml/2006/diagram" xmlns:o="urn:schemas-microsoft-com:office:office" xmlns:v="urn:schemas-microsoft-com:vml" xmlns:pvml="urn:schemas-microsoft-com:office:powerpoint" xmlns:com="http://schemas.openxmlformats.org/drawingml/2006/compatibility" xmlns:p14="http://schemas.microsoft.com/office/powerpoint/2010/main" xmlns:p15="http://schemas.microsoft.com/office/powerpoint/2012/main" xmlns:ahyp="http://schemas.microsoft.com/office/drawing/2018/hyperlinkcolor" showMasterPhAnim="0" showMasterSp="0">
   <p:cSld>
     <p:spTree>
       <p:nvGrpSpPr>
-        <p:cNvPr id="196" name="Shape 196"/>
+        <p:cNvPr id="218" name="Shape 218"/>
         <p:cNvGrpSpPr/>
         <p:nvPr/>
       </p:nvGrpSpPr>
@@ -1024,7 +1331,7 @@
       </p:grpSpPr>
       <p:sp>
         <p:nvSpPr>
-          <p:cNvPr id="197" name="Google Shape;197;g23a50b07eb6_2_121:notes"/>
+          <p:cNvPr id="219" name="Google Shape;219;g23a50b07eb6_2_121:notes"/>
           <p:cNvSpPr txBox="1"/>
           <p:nvPr>
             <p:ph idx="1" type="body"/>
@@ -1063,7 +1370,7 @@
       </p:sp>
       <p:sp>
         <p:nvSpPr>
-          <p:cNvPr id="198" name="Google Shape;198;g23a50b07eb6_2_121:notes"/>
+          <p:cNvPr id="220" name="Google Shape;220;g23a50b07eb6_2_121:notes"/>
           <p:cNvSpPr/>
           <p:nvPr>
             <p:ph idx="2" type="sldImg"/>
@@ -1104,12 +1411,12 @@
 </p:notes>
 </file>
 
-<file path=ppt/notesSlides/notesSlide13.xml><?xml version="1.0" encoding="utf-8"?>
+<file path=ppt/notesSlides/notesSlide16.xml><?xml version="1.0" encoding="utf-8"?>
 <p:notes xmlns:a="http://schemas.openxmlformats.org/drawingml/2006/main" xmlns:r="http://schemas.openxmlformats.org/officeDocument/2006/relationships" xmlns:mc="http://schemas.openxmlformats.org/markup-compatibility/2006" xmlns:mv="urn:schemas-microsoft-com:mac:vml" xmlns:p="http://schemas.openxmlformats.org/presentationml/2006/main" xmlns:c="http://schemas.openxmlformats.org/drawingml/2006/chart" xmlns:dgm="http://schemas.openxmlformats.org/drawingml/2006/diagram" xmlns:o="urn:schemas-microsoft-com:office:office" xmlns:v="urn:schemas-microsoft-com:vml" xmlns:pvml="urn:schemas-microsoft-com:office:powerpoint" xmlns:com="http://schemas.openxmlformats.org/drawingml/2006/compatibility" xmlns:p14="http://schemas.microsoft.com/office/powerpoint/2010/main" xmlns:p15="http://schemas.microsoft.com/office/powerpoint/2012/main" xmlns:ahyp="http://schemas.microsoft.com/office/drawing/2018/hyperlinkcolor" showMasterPhAnim="0" showMasterSp="0">
   <p:cSld>
     <p:spTree>
       <p:nvGrpSpPr>
-        <p:cNvPr id="202" name="Shape 202"/>
+        <p:cNvPr id="224" name="Shape 224"/>
         <p:cNvGrpSpPr/>
         <p:nvPr/>
       </p:nvGrpSpPr>
@@ -1123,7 +1430,7 @@
       </p:grpSpPr>
       <p:sp>
         <p:nvSpPr>
-          <p:cNvPr id="203" name="Google Shape;203;g23a50b07eb6_0_0:notes"/>
+          <p:cNvPr id="225" name="Google Shape;225;g23a50b07eb6_0_0:notes"/>
           <p:cNvSpPr/>
           <p:nvPr>
             <p:ph idx="2" type="sldImg"/>
@@ -1158,7 +1465,7 @@
       </p:sp>
       <p:sp>
         <p:nvSpPr>
-          <p:cNvPr id="204" name="Google Shape;204;g23a50b07eb6_0_0:notes"/>
+          <p:cNvPr id="226" name="Google Shape;226;g23a50b07eb6_0_0:notes"/>
           <p:cNvSpPr txBox="1"/>
           <p:nvPr>
             <p:ph idx="1" type="body"/>
@@ -1222,42 +1529,7 @@
       </p:grpSpPr>
       <p:sp>
         <p:nvSpPr>
-          <p:cNvPr id="137" name="Google Shape;137;g23a50b07eb6_0_10:notes"/>
-          <p:cNvSpPr/>
-          <p:nvPr>
-            <p:ph idx="2" type="sldImg"/>
-          </p:nvPr>
-        </p:nvSpPr>
-        <p:spPr>
-          <a:xfrm>
-            <a:off x="381300" y="685800"/>
-            <a:ext cx="6096000" cy="3429000"/>
-          </a:xfrm>
-          <a:custGeom>
-            <a:rect b="b" l="l" r="r" t="t"/>
-            <a:pathLst>
-              <a:path extrusionOk="0" h="120000" w="120000">
-                <a:moveTo>
-                  <a:pt x="0" y="0"/>
-                </a:moveTo>
-                <a:lnTo>
-                  <a:pt x="120000" y="0"/>
-                </a:lnTo>
-                <a:lnTo>
-                  <a:pt x="120000" y="120000"/>
-                </a:lnTo>
-                <a:lnTo>
-                  <a:pt x="0" y="120000"/>
-                </a:lnTo>
-                <a:close/>
-              </a:path>
-            </a:pathLst>
-          </a:custGeom>
-        </p:spPr>
-      </p:sp>
-      <p:sp>
-        <p:nvSpPr>
-          <p:cNvPr id="138" name="Google Shape;138;g23a50b07eb6_0_10:notes"/>
+          <p:cNvPr id="137" name="Google Shape;137;g23a50b07eb6_2_96:notes"/>
           <p:cNvSpPr txBox="1"/>
           <p:nvPr>
             <p:ph idx="1" type="body"/>
@@ -1294,73 +1566,9 @@
           </a:p>
         </p:txBody>
       </p:sp>
-    </p:spTree>
-  </p:cSld>
-  <p:clrMapOvr>
-    <a:masterClrMapping/>
-  </p:clrMapOvr>
-</p:notes>
-</file>
-
-<file path=ppt/notesSlides/notesSlide3.xml><?xml version="1.0" encoding="utf-8"?>
-<p:notes xmlns:a="http://schemas.openxmlformats.org/drawingml/2006/main" xmlns:r="http://schemas.openxmlformats.org/officeDocument/2006/relationships" xmlns:mc="http://schemas.openxmlformats.org/markup-compatibility/2006" xmlns:mv="urn:schemas-microsoft-com:mac:vml" xmlns:p="http://schemas.openxmlformats.org/presentationml/2006/main" xmlns:c="http://schemas.openxmlformats.org/drawingml/2006/chart" xmlns:dgm="http://schemas.openxmlformats.org/drawingml/2006/diagram" xmlns:o="urn:schemas-microsoft-com:office:office" xmlns:v="urn:schemas-microsoft-com:vml" xmlns:pvml="urn:schemas-microsoft-com:office:powerpoint" xmlns:com="http://schemas.openxmlformats.org/drawingml/2006/compatibility" xmlns:p14="http://schemas.microsoft.com/office/powerpoint/2010/main" xmlns:p15="http://schemas.microsoft.com/office/powerpoint/2012/main" xmlns:ahyp="http://schemas.microsoft.com/office/drawing/2018/hyperlinkcolor" showMasterPhAnim="0" showMasterSp="0">
-  <p:cSld>
-    <p:spTree>
-      <p:nvGrpSpPr>
-        <p:cNvPr id="142" name="Shape 142"/>
-        <p:cNvGrpSpPr/>
-        <p:nvPr/>
-      </p:nvGrpSpPr>
-      <p:grpSpPr>
-        <a:xfrm>
-          <a:off x="0" y="0"/>
-          <a:ext cx="0" cy="0"/>
-          <a:chOff x="0" y="0"/>
-          <a:chExt cx="0" cy="0"/>
-        </a:xfrm>
-      </p:grpSpPr>
       <p:sp>
         <p:nvSpPr>
-          <p:cNvPr id="143" name="Google Shape;143;g23a50b07eb6_2_86:notes"/>
-          <p:cNvSpPr txBox="1"/>
-          <p:nvPr>
-            <p:ph idx="1" type="body"/>
-          </p:nvPr>
-        </p:nvSpPr>
-        <p:spPr>
-          <a:xfrm>
-            <a:off x="685800" y="4343400"/>
-            <a:ext cx="5486400" cy="4114800"/>
-          </a:xfrm>
-          <a:prstGeom prst="rect">
-            <a:avLst/>
-          </a:prstGeom>
-        </p:spPr>
-        <p:txBody>
-          <a:bodyPr anchorCtr="0" anchor="t" bIns="91425" lIns="91425" spcFirstLastPara="1" rIns="91425" wrap="square" tIns="91425">
-            <a:noAutofit/>
-          </a:bodyPr>
-          <a:lstStyle/>
-          <a:p>
-            <a:pPr indent="0" lvl="0" marL="0" rtl="0" algn="l">
-              <a:spcBef>
-                <a:spcPts val="0"/>
-              </a:spcBef>
-              <a:spcAft>
-                <a:spcPts val="0"/>
-              </a:spcAft>
-              <a:buNone/>
-            </a:pPr>
-            <a:r>
-              <a:t/>
-            </a:r>
-            <a:endParaRPr/>
-          </a:p>
-        </p:txBody>
-      </p:sp>
-      <p:sp>
-        <p:nvSpPr>
-          <p:cNvPr id="144" name="Google Shape;144;g23a50b07eb6_2_86:notes"/>
+          <p:cNvPr id="138" name="Google Shape;138;g23a50b07eb6_2_96:notes"/>
           <p:cNvSpPr/>
           <p:nvPr>
             <p:ph idx="2" type="sldImg"/>
@@ -1401,12 +1609,12 @@
 </p:notes>
 </file>
 
-<file path=ppt/notesSlides/notesSlide4.xml><?xml version="1.0" encoding="utf-8"?>
+<file path=ppt/notesSlides/notesSlide3.xml><?xml version="1.0" encoding="utf-8"?>
 <p:notes xmlns:a="http://schemas.openxmlformats.org/drawingml/2006/main" xmlns:r="http://schemas.openxmlformats.org/officeDocument/2006/relationships" xmlns:mc="http://schemas.openxmlformats.org/markup-compatibility/2006" xmlns:mv="urn:schemas-microsoft-com:mac:vml" xmlns:p="http://schemas.openxmlformats.org/presentationml/2006/main" xmlns:c="http://schemas.openxmlformats.org/drawingml/2006/chart" xmlns:dgm="http://schemas.openxmlformats.org/drawingml/2006/diagram" xmlns:o="urn:schemas-microsoft-com:office:office" xmlns:v="urn:schemas-microsoft-com:vml" xmlns:pvml="urn:schemas-microsoft-com:office:powerpoint" xmlns:com="http://schemas.openxmlformats.org/drawingml/2006/compatibility" xmlns:p14="http://schemas.microsoft.com/office/powerpoint/2010/main" xmlns:p15="http://schemas.microsoft.com/office/powerpoint/2012/main" xmlns:ahyp="http://schemas.microsoft.com/office/drawing/2018/hyperlinkcolor" showMasterPhAnim="0" showMasterSp="0">
   <p:cSld>
     <p:spTree>
       <p:nvGrpSpPr>
-        <p:cNvPr id="148" name="Shape 148"/>
+        <p:cNvPr id="142" name="Shape 142"/>
         <p:cNvGrpSpPr/>
         <p:nvPr/>
       </p:nvGrpSpPr>
@@ -1420,7 +1628,7 @@
       </p:grpSpPr>
       <p:sp>
         <p:nvSpPr>
-          <p:cNvPr id="149" name="Google Shape;149;g23a50b07eb6_0_15:notes"/>
+          <p:cNvPr id="143" name="Google Shape;143;g23a50b07eb6_0_10:notes"/>
           <p:cNvSpPr/>
           <p:nvPr>
             <p:ph idx="2" type="sldImg"/>
@@ -1455,7 +1663,7 @@
       </p:sp>
       <p:sp>
         <p:nvSpPr>
-          <p:cNvPr id="150" name="Google Shape;150;g23a50b07eb6_0_15:notes"/>
+          <p:cNvPr id="144" name="Google Shape;144;g23a50b07eb6_0_10:notes"/>
           <p:cNvSpPr txBox="1"/>
           <p:nvPr>
             <p:ph idx="1" type="body"/>
@@ -1500,12 +1708,12 @@
 </p:notes>
 </file>
 
-<file path=ppt/notesSlides/notesSlide5.xml><?xml version="1.0" encoding="utf-8"?>
+<file path=ppt/notesSlides/notesSlide4.xml><?xml version="1.0" encoding="utf-8"?>
 <p:notes xmlns:a="http://schemas.openxmlformats.org/drawingml/2006/main" xmlns:r="http://schemas.openxmlformats.org/officeDocument/2006/relationships" xmlns:mc="http://schemas.openxmlformats.org/markup-compatibility/2006" xmlns:mv="urn:schemas-microsoft-com:mac:vml" xmlns:p="http://schemas.openxmlformats.org/presentationml/2006/main" xmlns:c="http://schemas.openxmlformats.org/drawingml/2006/chart" xmlns:dgm="http://schemas.openxmlformats.org/drawingml/2006/diagram" xmlns:o="urn:schemas-microsoft-com:office:office" xmlns:v="urn:schemas-microsoft-com:vml" xmlns:pvml="urn:schemas-microsoft-com:office:powerpoint" xmlns:com="http://schemas.openxmlformats.org/drawingml/2006/compatibility" xmlns:p14="http://schemas.microsoft.com/office/powerpoint/2010/main" xmlns:p15="http://schemas.microsoft.com/office/powerpoint/2012/main" xmlns:ahyp="http://schemas.microsoft.com/office/drawing/2018/hyperlinkcolor" showMasterPhAnim="0" showMasterSp="0">
   <p:cSld>
     <p:spTree>
       <p:nvGrpSpPr>
-        <p:cNvPr id="154" name="Shape 154"/>
+        <p:cNvPr id="148" name="Shape 148"/>
         <p:cNvGrpSpPr/>
         <p:nvPr/>
       </p:nvGrpSpPr>
@@ -1519,7 +1727,7 @@
       </p:grpSpPr>
       <p:sp>
         <p:nvSpPr>
-          <p:cNvPr id="155" name="Google Shape;155;g23a50b07eb6_2_91:notes"/>
+          <p:cNvPr id="149" name="Google Shape;149;g23a50b07eb6_2_86:notes"/>
           <p:cNvSpPr txBox="1"/>
           <p:nvPr>
             <p:ph idx="1" type="body"/>
@@ -1558,7 +1766,7 @@
       </p:sp>
       <p:sp>
         <p:nvSpPr>
-          <p:cNvPr id="156" name="Google Shape;156;g23a50b07eb6_2_91:notes"/>
+          <p:cNvPr id="150" name="Google Shape;150;g23a50b07eb6_2_86:notes"/>
           <p:cNvSpPr/>
           <p:nvPr>
             <p:ph idx="2" type="sldImg"/>
@@ -1599,12 +1807,12 @@
 </p:notes>
 </file>
 
-<file path=ppt/notesSlides/notesSlide6.xml><?xml version="1.0" encoding="utf-8"?>
+<file path=ppt/notesSlides/notesSlide5.xml><?xml version="1.0" encoding="utf-8"?>
 <p:notes xmlns:a="http://schemas.openxmlformats.org/drawingml/2006/main" xmlns:r="http://schemas.openxmlformats.org/officeDocument/2006/relationships" xmlns:mc="http://schemas.openxmlformats.org/markup-compatibility/2006" xmlns:mv="urn:schemas-microsoft-com:mac:vml" xmlns:p="http://schemas.openxmlformats.org/presentationml/2006/main" xmlns:c="http://schemas.openxmlformats.org/drawingml/2006/chart" xmlns:dgm="http://schemas.openxmlformats.org/drawingml/2006/diagram" xmlns:o="urn:schemas-microsoft-com:office:office" xmlns:v="urn:schemas-microsoft-com:vml" xmlns:pvml="urn:schemas-microsoft-com:office:powerpoint" xmlns:com="http://schemas.openxmlformats.org/drawingml/2006/compatibility" xmlns:p14="http://schemas.microsoft.com/office/powerpoint/2010/main" xmlns:p15="http://schemas.microsoft.com/office/powerpoint/2012/main" xmlns:ahyp="http://schemas.microsoft.com/office/drawing/2018/hyperlinkcolor" showMasterPhAnim="0" showMasterSp="0">
   <p:cSld>
     <p:spTree>
       <p:nvGrpSpPr>
-        <p:cNvPr id="160" name="Shape 160"/>
+        <p:cNvPr id="154" name="Shape 154"/>
         <p:cNvGrpSpPr/>
         <p:nvPr/>
       </p:nvGrpSpPr>
@@ -1618,7 +1826,42 @@
       </p:grpSpPr>
       <p:sp>
         <p:nvSpPr>
-          <p:cNvPr id="161" name="Google Shape;161;g23a50b07eb6_2_96:notes"/>
+          <p:cNvPr id="155" name="Google Shape;155;g23a50b07eb6_0_15:notes"/>
+          <p:cNvSpPr/>
+          <p:nvPr>
+            <p:ph idx="2" type="sldImg"/>
+          </p:nvPr>
+        </p:nvSpPr>
+        <p:spPr>
+          <a:xfrm>
+            <a:off x="381300" y="685800"/>
+            <a:ext cx="6096000" cy="3429000"/>
+          </a:xfrm>
+          <a:custGeom>
+            <a:rect b="b" l="l" r="r" t="t"/>
+            <a:pathLst>
+              <a:path extrusionOk="0" h="120000" w="120000">
+                <a:moveTo>
+                  <a:pt x="0" y="0"/>
+                </a:moveTo>
+                <a:lnTo>
+                  <a:pt x="120000" y="0"/>
+                </a:lnTo>
+                <a:lnTo>
+                  <a:pt x="120000" y="120000"/>
+                </a:lnTo>
+                <a:lnTo>
+                  <a:pt x="0" y="120000"/>
+                </a:lnTo>
+                <a:close/>
+              </a:path>
+            </a:pathLst>
+          </a:custGeom>
+        </p:spPr>
+      </p:sp>
+      <p:sp>
+        <p:nvSpPr>
+          <p:cNvPr id="156" name="Google Shape;156;g23a50b07eb6_0_15:notes"/>
           <p:cNvSpPr txBox="1"/>
           <p:nvPr>
             <p:ph idx="1" type="body"/>
@@ -1655,9 +1898,73 @@
           </a:p>
         </p:txBody>
       </p:sp>
+    </p:spTree>
+  </p:cSld>
+  <p:clrMapOvr>
+    <a:masterClrMapping/>
+  </p:clrMapOvr>
+</p:notes>
+</file>
+
+<file path=ppt/notesSlides/notesSlide6.xml><?xml version="1.0" encoding="utf-8"?>
+<p:notes xmlns:a="http://schemas.openxmlformats.org/drawingml/2006/main" xmlns:r="http://schemas.openxmlformats.org/officeDocument/2006/relationships" xmlns:mc="http://schemas.openxmlformats.org/markup-compatibility/2006" xmlns:mv="urn:schemas-microsoft-com:mac:vml" xmlns:p="http://schemas.openxmlformats.org/presentationml/2006/main" xmlns:c="http://schemas.openxmlformats.org/drawingml/2006/chart" xmlns:dgm="http://schemas.openxmlformats.org/drawingml/2006/diagram" xmlns:o="urn:schemas-microsoft-com:office:office" xmlns:v="urn:schemas-microsoft-com:vml" xmlns:pvml="urn:schemas-microsoft-com:office:powerpoint" xmlns:com="http://schemas.openxmlformats.org/drawingml/2006/compatibility" xmlns:p14="http://schemas.microsoft.com/office/powerpoint/2010/main" xmlns:p15="http://schemas.microsoft.com/office/powerpoint/2012/main" xmlns:ahyp="http://schemas.microsoft.com/office/drawing/2018/hyperlinkcolor" showMasterPhAnim="0" showMasterSp="0">
+  <p:cSld>
+    <p:spTree>
+      <p:nvGrpSpPr>
+        <p:cNvPr id="160" name="Shape 160"/>
+        <p:cNvGrpSpPr/>
+        <p:nvPr/>
+      </p:nvGrpSpPr>
+      <p:grpSpPr>
+        <a:xfrm>
+          <a:off x="0" y="0"/>
+          <a:ext cx="0" cy="0"/>
+          <a:chOff x="0" y="0"/>
+          <a:chExt cx="0" cy="0"/>
+        </a:xfrm>
+      </p:grpSpPr>
       <p:sp>
         <p:nvSpPr>
-          <p:cNvPr id="162" name="Google Shape;162;g23a50b07eb6_2_96:notes"/>
+          <p:cNvPr id="161" name="Google Shape;161;g23a50b07eb6_2_91:notes"/>
+          <p:cNvSpPr txBox="1"/>
+          <p:nvPr>
+            <p:ph idx="1" type="body"/>
+          </p:nvPr>
+        </p:nvSpPr>
+        <p:spPr>
+          <a:xfrm>
+            <a:off x="685800" y="4343400"/>
+            <a:ext cx="5486400" cy="4114800"/>
+          </a:xfrm>
+          <a:prstGeom prst="rect">
+            <a:avLst/>
+          </a:prstGeom>
+        </p:spPr>
+        <p:txBody>
+          <a:bodyPr anchorCtr="0" anchor="t" bIns="91425" lIns="91425" spcFirstLastPara="1" rIns="91425" wrap="square" tIns="91425">
+            <a:noAutofit/>
+          </a:bodyPr>
+          <a:lstStyle/>
+          <a:p>
+            <a:pPr indent="0" lvl="0" marL="0" rtl="0" algn="l">
+              <a:spcBef>
+                <a:spcPts val="0"/>
+              </a:spcBef>
+              <a:spcAft>
+                <a:spcPts val="0"/>
+              </a:spcAft>
+              <a:buNone/>
+            </a:pPr>
+            <a:r>
+              <a:t/>
+            </a:r>
+            <a:endParaRPr/>
+          </a:p>
+        </p:txBody>
+      </p:sp>
+      <p:sp>
+        <p:nvSpPr>
+          <p:cNvPr id="162" name="Google Shape;162;g23a50b07eb6_2_91:notes"/>
           <p:cNvSpPr/>
           <p:nvPr>
             <p:ph idx="2" type="sldImg"/>
@@ -1816,106 +2123,7 @@
       </p:grpSpPr>
       <p:sp>
         <p:nvSpPr>
-          <p:cNvPr id="173" name="Google Shape;173;g23a50b07eb6_2_101:notes"/>
-          <p:cNvSpPr txBox="1"/>
-          <p:nvPr>
-            <p:ph idx="1" type="body"/>
-          </p:nvPr>
-        </p:nvSpPr>
-        <p:spPr>
-          <a:xfrm>
-            <a:off x="685800" y="4343400"/>
-            <a:ext cx="5486400" cy="4114800"/>
-          </a:xfrm>
-          <a:prstGeom prst="rect">
-            <a:avLst/>
-          </a:prstGeom>
-        </p:spPr>
-        <p:txBody>
-          <a:bodyPr anchorCtr="0" anchor="t" bIns="91425" lIns="91425" spcFirstLastPara="1" rIns="91425" wrap="square" tIns="91425">
-            <a:noAutofit/>
-          </a:bodyPr>
-          <a:lstStyle/>
-          <a:p>
-            <a:pPr indent="0" lvl="0" marL="0" rtl="0" algn="l">
-              <a:spcBef>
-                <a:spcPts val="0"/>
-              </a:spcBef>
-              <a:spcAft>
-                <a:spcPts val="0"/>
-              </a:spcAft>
-              <a:buNone/>
-            </a:pPr>
-            <a:r>
-              <a:t/>
-            </a:r>
-            <a:endParaRPr/>
-          </a:p>
-        </p:txBody>
-      </p:sp>
-      <p:sp>
-        <p:nvSpPr>
-          <p:cNvPr id="174" name="Google Shape;174;g23a50b07eb6_2_101:notes"/>
-          <p:cNvSpPr/>
-          <p:nvPr>
-            <p:ph idx="2" type="sldImg"/>
-          </p:nvPr>
-        </p:nvSpPr>
-        <p:spPr>
-          <a:xfrm>
-            <a:off x="1143225" y="685800"/>
-            <a:ext cx="4572225" cy="3429000"/>
-          </a:xfrm>
-          <a:custGeom>
-            <a:rect b="b" l="l" r="r" t="t"/>
-            <a:pathLst>
-              <a:path extrusionOk="0" h="120000" w="120000">
-                <a:moveTo>
-                  <a:pt x="0" y="0"/>
-                </a:moveTo>
-                <a:lnTo>
-                  <a:pt x="120000" y="0"/>
-                </a:lnTo>
-                <a:lnTo>
-                  <a:pt x="120000" y="120000"/>
-                </a:lnTo>
-                <a:lnTo>
-                  <a:pt x="0" y="120000"/>
-                </a:lnTo>
-                <a:close/>
-              </a:path>
-            </a:pathLst>
-          </a:custGeom>
-        </p:spPr>
-      </p:sp>
-    </p:spTree>
-  </p:cSld>
-  <p:clrMapOvr>
-    <a:masterClrMapping/>
-  </p:clrMapOvr>
-</p:notes>
-</file>
-
-<file path=ppt/notesSlides/notesSlide9.xml><?xml version="1.0" encoding="utf-8"?>
-<p:notes xmlns:a="http://schemas.openxmlformats.org/drawingml/2006/main" xmlns:r="http://schemas.openxmlformats.org/officeDocument/2006/relationships" xmlns:mc="http://schemas.openxmlformats.org/markup-compatibility/2006" xmlns:mv="urn:schemas-microsoft-com:mac:vml" xmlns:p="http://schemas.openxmlformats.org/presentationml/2006/main" xmlns:c="http://schemas.openxmlformats.org/drawingml/2006/chart" xmlns:dgm="http://schemas.openxmlformats.org/drawingml/2006/diagram" xmlns:o="urn:schemas-microsoft-com:office:office" xmlns:v="urn:schemas-microsoft-com:vml" xmlns:pvml="urn:schemas-microsoft-com:office:powerpoint" xmlns:com="http://schemas.openxmlformats.org/drawingml/2006/compatibility" xmlns:p14="http://schemas.microsoft.com/office/powerpoint/2010/main" xmlns:p15="http://schemas.microsoft.com/office/powerpoint/2012/main" xmlns:ahyp="http://schemas.microsoft.com/office/drawing/2018/hyperlinkcolor" showMasterPhAnim="0" showMasterSp="0">
-  <p:cSld>
-    <p:spTree>
-      <p:nvGrpSpPr>
-        <p:cNvPr id="178" name="Shape 178"/>
-        <p:cNvGrpSpPr/>
-        <p:nvPr/>
-      </p:nvGrpSpPr>
-      <p:grpSpPr>
-        <a:xfrm>
-          <a:off x="0" y="0"/>
-          <a:ext cx="0" cy="0"/>
-          <a:chOff x="0" y="0"/>
-          <a:chExt cx="0" cy="0"/>
-        </a:xfrm>
-      </p:grpSpPr>
-      <p:sp>
-        <p:nvSpPr>
-          <p:cNvPr id="179" name="Google Shape;179;g23a50b07eb6_0_22:notes"/>
+          <p:cNvPr id="173" name="Google Shape;173;g23a50b07eb6_0_22:notes"/>
           <p:cNvSpPr/>
           <p:nvPr>
             <p:ph idx="2" type="sldImg"/>
@@ -1950,7 +2158,7 @@
       </p:sp>
       <p:sp>
         <p:nvSpPr>
-          <p:cNvPr id="180" name="Google Shape;180;g23a50b07eb6_0_22:notes"/>
+          <p:cNvPr id="174" name="Google Shape;174;g23a50b07eb6_0_22:notes"/>
           <p:cNvSpPr txBox="1"/>
           <p:nvPr>
             <p:ph idx="1" type="body"/>
@@ -1986,6 +2194,105 @@
             <a:endParaRPr/>
           </a:p>
         </p:txBody>
+      </p:sp>
+    </p:spTree>
+  </p:cSld>
+  <p:clrMapOvr>
+    <a:masterClrMapping/>
+  </p:clrMapOvr>
+</p:notes>
+</file>
+
+<file path=ppt/notesSlides/notesSlide9.xml><?xml version="1.0" encoding="utf-8"?>
+<p:notes xmlns:a="http://schemas.openxmlformats.org/drawingml/2006/main" xmlns:r="http://schemas.openxmlformats.org/officeDocument/2006/relationships" xmlns:mc="http://schemas.openxmlformats.org/markup-compatibility/2006" xmlns:mv="urn:schemas-microsoft-com:mac:vml" xmlns:p="http://schemas.openxmlformats.org/presentationml/2006/main" xmlns:c="http://schemas.openxmlformats.org/drawingml/2006/chart" xmlns:dgm="http://schemas.openxmlformats.org/drawingml/2006/diagram" xmlns:o="urn:schemas-microsoft-com:office:office" xmlns:v="urn:schemas-microsoft-com:vml" xmlns:pvml="urn:schemas-microsoft-com:office:powerpoint" xmlns:com="http://schemas.openxmlformats.org/drawingml/2006/compatibility" xmlns:p14="http://schemas.microsoft.com/office/powerpoint/2010/main" xmlns:p15="http://schemas.microsoft.com/office/powerpoint/2012/main" xmlns:ahyp="http://schemas.microsoft.com/office/drawing/2018/hyperlinkcolor" showMasterPhAnim="0" showMasterSp="0">
+  <p:cSld>
+    <p:spTree>
+      <p:nvGrpSpPr>
+        <p:cNvPr id="178" name="Shape 178"/>
+        <p:cNvGrpSpPr/>
+        <p:nvPr/>
+      </p:nvGrpSpPr>
+      <p:grpSpPr>
+        <a:xfrm>
+          <a:off x="0" y="0"/>
+          <a:ext cx="0" cy="0"/>
+          <a:chOff x="0" y="0"/>
+          <a:chExt cx="0" cy="0"/>
+        </a:xfrm>
+      </p:grpSpPr>
+      <p:sp>
+        <p:nvSpPr>
+          <p:cNvPr id="179" name="Google Shape;179;g23a50b07eb6_2_111:notes"/>
+          <p:cNvSpPr txBox="1"/>
+          <p:nvPr>
+            <p:ph idx="1" type="body"/>
+          </p:nvPr>
+        </p:nvSpPr>
+        <p:spPr>
+          <a:xfrm>
+            <a:off x="685800" y="4343400"/>
+            <a:ext cx="5486400" cy="4114800"/>
+          </a:xfrm>
+          <a:prstGeom prst="rect">
+            <a:avLst/>
+          </a:prstGeom>
+        </p:spPr>
+        <p:txBody>
+          <a:bodyPr anchorCtr="0" anchor="t" bIns="91425" lIns="91425" spcFirstLastPara="1" rIns="91425" wrap="square" tIns="91425">
+            <a:noAutofit/>
+          </a:bodyPr>
+          <a:lstStyle/>
+          <a:p>
+            <a:pPr indent="0" lvl="0" marL="0" rtl="0" algn="l">
+              <a:spcBef>
+                <a:spcPts val="0"/>
+              </a:spcBef>
+              <a:spcAft>
+                <a:spcPts val="0"/>
+              </a:spcAft>
+              <a:buNone/>
+            </a:pPr>
+            <a:r>
+              <a:t/>
+            </a:r>
+            <a:endParaRPr/>
+          </a:p>
+        </p:txBody>
+      </p:sp>
+      <p:sp>
+        <p:nvSpPr>
+          <p:cNvPr id="180" name="Google Shape;180;g23a50b07eb6_2_111:notes"/>
+          <p:cNvSpPr/>
+          <p:nvPr>
+            <p:ph idx="2" type="sldImg"/>
+          </p:nvPr>
+        </p:nvSpPr>
+        <p:spPr>
+          <a:xfrm>
+            <a:off x="1143225" y="685800"/>
+            <a:ext cx="4572225" cy="3429000"/>
+          </a:xfrm>
+          <a:custGeom>
+            <a:rect b="b" l="l" r="r" t="t"/>
+            <a:pathLst>
+              <a:path extrusionOk="0" h="120000" w="120000">
+                <a:moveTo>
+                  <a:pt x="0" y="0"/>
+                </a:moveTo>
+                <a:lnTo>
+                  <a:pt x="120000" y="0"/>
+                </a:lnTo>
+                <a:lnTo>
+                  <a:pt x="120000" y="120000"/>
+                </a:lnTo>
+                <a:lnTo>
+                  <a:pt x="0" y="120000"/>
+                </a:lnTo>
+                <a:close/>
+              </a:path>
+            </a:pathLst>
+          </a:custGeom>
+        </p:spPr>
       </p:sp>
     </p:spTree>
   </p:cSld>
@@ -16786,7 +17093,7 @@
         </p:spPr>
         <p:txBody>
           <a:bodyPr anchorCtr="0" anchor="t" bIns="34275" lIns="68575" spcFirstLastPara="1" rIns="68575" wrap="square" tIns="34275">
-            <a:normAutofit/>
+            <a:normAutofit fontScale="92500"/>
           </a:bodyPr>
           <a:lstStyle/>
           <a:p>
@@ -16803,12 +17110,12 @@
               <a:buClr>
                 <a:schemeClr val="dk1"/>
               </a:buClr>
-              <a:buSzPts val="1300"/>
+              <a:buSzPct val="100000"/>
               <a:buNone/>
             </a:pPr>
             <a:r>
               <a:rPr lang="en" sz="1300"/>
-              <a:t>Presented by: Raksha Karthikeyan, Alexander Melamed, Erickson Vo, Stephanie Garrett</a:t>
+              <a:t>Presented by: Raksha Karthikeyan, Alexander Melamed, Erickson Vo and Stephanie Garrett</a:t>
             </a:r>
             <a:endParaRPr/>
           </a:p>
@@ -16964,6 +17271,896 @@
         </p:nvSpPr>
         <p:spPr>
           <a:xfrm>
+            <a:off x="222429" y="47082"/>
+            <a:ext cx="8246700" cy="808500"/>
+          </a:xfrm>
+          <a:prstGeom prst="rect">
+            <a:avLst/>
+          </a:prstGeom>
+          <a:noFill/>
+          <a:ln>
+            <a:noFill/>
+          </a:ln>
+        </p:spPr>
+        <p:txBody>
+          <a:bodyPr anchorCtr="0" anchor="t" bIns="34275" lIns="68575" spcFirstLastPara="1" rIns="68575" wrap="square" tIns="34275">
+            <a:normAutofit/>
+          </a:bodyPr>
+          <a:lstStyle/>
+          <a:p>
+            <a:pPr indent="0" lvl="0" marL="0" rtl="0" algn="l">
+              <a:lnSpc>
+                <a:spcPct val="85000"/>
+              </a:lnSpc>
+              <a:spcBef>
+                <a:spcPts val="0"/>
+              </a:spcBef>
+              <a:spcAft>
+                <a:spcPts val="0"/>
+              </a:spcAft>
+              <a:buClr>
+                <a:schemeClr val="accent1"/>
+              </a:buClr>
+              <a:buSzPts val="2700"/>
+              <a:buFont typeface="Arial"/>
+              <a:buNone/>
+            </a:pPr>
+            <a:r>
+              <a:rPr lang="en"/>
+              <a:t>Charts (R Statistics): feature engineering</a:t>
+            </a:r>
+            <a:endParaRPr/>
+          </a:p>
+        </p:txBody>
+      </p:sp>
+      <p:sp>
+        <p:nvSpPr>
+          <p:cNvPr id="189" name="Google Shape;189;p34"/>
+          <p:cNvSpPr txBox="1"/>
+          <p:nvPr>
+            <p:ph idx="1" type="body"/>
+          </p:nvPr>
+        </p:nvSpPr>
+        <p:spPr>
+          <a:xfrm>
+            <a:off x="4864900" y="730325"/>
+            <a:ext cx="4093500" cy="3861900"/>
+          </a:xfrm>
+          <a:prstGeom prst="rect">
+            <a:avLst/>
+          </a:prstGeom>
+          <a:noFill/>
+          <a:ln>
+            <a:noFill/>
+          </a:ln>
+        </p:spPr>
+        <p:txBody>
+          <a:bodyPr anchorCtr="0" anchor="t" bIns="34275" lIns="68575" spcFirstLastPara="1" rIns="68575" wrap="square" tIns="34275">
+            <a:normAutofit/>
+          </a:bodyPr>
+          <a:lstStyle/>
+          <a:p>
+            <a:pPr indent="0" lvl="0" marL="0" rtl="0" algn="l">
+              <a:lnSpc>
+                <a:spcPct val="110000"/>
+              </a:lnSpc>
+              <a:spcBef>
+                <a:spcPts val="0"/>
+              </a:spcBef>
+              <a:spcAft>
+                <a:spcPts val="0"/>
+              </a:spcAft>
+              <a:buClr>
+                <a:schemeClr val="dk1"/>
+              </a:buClr>
+              <a:buSzPts val="1500"/>
+              <a:buNone/>
+            </a:pPr>
+            <a:r>
+              <a:rPr lang="en" sz="1100"/>
+              <a:t>In order to determine what factors we should focus on out of the options we have available with the CRE </a:t>
+            </a:r>
+            <a:r>
+              <a:rPr lang="en" sz="1200"/>
+              <a:t>vulnerabilities</a:t>
+            </a:r>
+            <a:r>
+              <a:rPr lang="en" sz="1100"/>
+              <a:t> and different populations, we employed R and used a linear regression model.</a:t>
+            </a:r>
+            <a:endParaRPr sz="1100"/>
+          </a:p>
+          <a:p>
+            <a:pPr indent="-76200" lvl="0" marL="177800" rtl="0" algn="l">
+              <a:lnSpc>
+                <a:spcPct val="110000"/>
+              </a:lnSpc>
+              <a:spcBef>
+                <a:spcPts val="0"/>
+              </a:spcBef>
+              <a:spcAft>
+                <a:spcPts val="0"/>
+              </a:spcAft>
+              <a:buClr>
+                <a:schemeClr val="dk1"/>
+              </a:buClr>
+              <a:buSzPts val="1500"/>
+              <a:buNone/>
+            </a:pPr>
+            <a:r>
+              <a:t/>
+            </a:r>
+            <a:endParaRPr sz="1100"/>
+          </a:p>
+          <a:p>
+            <a:pPr indent="0" lvl="0" marL="0" rtl="0" algn="l">
+              <a:lnSpc>
+                <a:spcPct val="110000"/>
+              </a:lnSpc>
+              <a:spcBef>
+                <a:spcPts val="0"/>
+              </a:spcBef>
+              <a:spcAft>
+                <a:spcPts val="0"/>
+              </a:spcAft>
+              <a:buClr>
+                <a:schemeClr val="dk1"/>
+              </a:buClr>
+              <a:buSzPts val="1500"/>
+              <a:buNone/>
+            </a:pPr>
+            <a:r>
+              <a:rPr lang="en" sz="1100"/>
+              <a:t>Using R ‘s linear regression function, we compared deaths to the race independent variables. We can say races with t-values greater than 2 is acceptable, and anything less than -2 is acceptable. </a:t>
+            </a:r>
+            <a:endParaRPr sz="1100"/>
+          </a:p>
+          <a:p>
+            <a:pPr indent="-76200" lvl="0" marL="177800" rtl="0" algn="l">
+              <a:lnSpc>
+                <a:spcPct val="110000"/>
+              </a:lnSpc>
+              <a:spcBef>
+                <a:spcPts val="0"/>
+              </a:spcBef>
+              <a:spcAft>
+                <a:spcPts val="0"/>
+              </a:spcAft>
+              <a:buClr>
+                <a:schemeClr val="dk1"/>
+              </a:buClr>
+              <a:buSzPts val="1500"/>
+              <a:buNone/>
+            </a:pPr>
+            <a:r>
+              <a:t/>
+            </a:r>
+            <a:endParaRPr sz="1100"/>
+          </a:p>
+          <a:p>
+            <a:pPr indent="-76200" lvl="0" marL="177800" rtl="0" algn="l">
+              <a:lnSpc>
+                <a:spcPct val="110000"/>
+              </a:lnSpc>
+              <a:spcBef>
+                <a:spcPts val="0"/>
+              </a:spcBef>
+              <a:spcAft>
+                <a:spcPts val="0"/>
+              </a:spcAft>
+              <a:buClr>
+                <a:schemeClr val="dk1"/>
+              </a:buClr>
+              <a:buSzPts val="1500"/>
+              <a:buNone/>
+            </a:pPr>
+            <a:r>
+              <a:t/>
+            </a:r>
+            <a:endParaRPr sz="1100"/>
+          </a:p>
+          <a:p>
+            <a:pPr indent="0" lvl="0" marL="0" rtl="0" algn="l">
+              <a:lnSpc>
+                <a:spcPct val="110000"/>
+              </a:lnSpc>
+              <a:spcBef>
+                <a:spcPts val="0"/>
+              </a:spcBef>
+              <a:spcAft>
+                <a:spcPts val="0"/>
+              </a:spcAft>
+              <a:buClr>
+                <a:schemeClr val="dk1"/>
+              </a:buClr>
+              <a:buSzPts val="1500"/>
+              <a:buNone/>
+            </a:pPr>
+            <a:r>
+              <a:rPr lang="en" sz="1100"/>
+              <a:t>This model shows statistical significance with the R-Squared value of 0.938, and a low p-value (2.2e-16). And given that the R-Squared is 93.8%, we can say that this model is effective at predicting deaths based on race.</a:t>
+            </a:r>
+            <a:endParaRPr sz="1100"/>
+          </a:p>
+          <a:p>
+            <a:pPr indent="0" lvl="0" marL="0" rtl="0" algn="l">
+              <a:lnSpc>
+                <a:spcPct val="110000"/>
+              </a:lnSpc>
+              <a:spcBef>
+                <a:spcPts val="0"/>
+              </a:spcBef>
+              <a:spcAft>
+                <a:spcPts val="0"/>
+              </a:spcAft>
+              <a:buClr>
+                <a:schemeClr val="dk1"/>
+              </a:buClr>
+              <a:buSzPts val="1500"/>
+              <a:buNone/>
+            </a:pPr>
+            <a:r>
+              <a:t/>
+            </a:r>
+            <a:endParaRPr sz="1100"/>
+          </a:p>
+          <a:p>
+            <a:pPr indent="0" lvl="0" marL="0" rtl="0" algn="l">
+              <a:lnSpc>
+                <a:spcPct val="110000"/>
+              </a:lnSpc>
+              <a:spcBef>
+                <a:spcPts val="0"/>
+              </a:spcBef>
+              <a:spcAft>
+                <a:spcPts val="0"/>
+              </a:spcAft>
+              <a:buClr>
+                <a:schemeClr val="dk1"/>
+              </a:buClr>
+              <a:buSzPts val="1500"/>
+              <a:buNone/>
+            </a:pPr>
+            <a:r>
+              <a:t/>
+            </a:r>
+            <a:endParaRPr sz="1100"/>
+          </a:p>
+        </p:txBody>
+      </p:sp>
+      <p:pic>
+        <p:nvPicPr>
+          <p:cNvPr id="190" name="Google Shape;190;p34"/>
+          <p:cNvPicPr preferRelativeResize="0"/>
+          <p:nvPr/>
+        </p:nvPicPr>
+        <p:blipFill>
+          <a:blip r:embed="rId3">
+            <a:alphaModFix/>
+          </a:blip>
+          <a:stretch>
+            <a:fillRect/>
+          </a:stretch>
+        </p:blipFill>
+        <p:spPr>
+          <a:xfrm>
+            <a:off x="457200" y="676525"/>
+            <a:ext cx="4168600" cy="3915700"/>
+          </a:xfrm>
+          <a:prstGeom prst="rect">
+            <a:avLst/>
+          </a:prstGeom>
+          <a:noFill/>
+          <a:ln>
+            <a:noFill/>
+          </a:ln>
+        </p:spPr>
+      </p:pic>
+    </p:spTree>
+  </p:cSld>
+  <p:clrMapOvr>
+    <a:masterClrMapping/>
+  </p:clrMapOvr>
+</p:sld>
+</file>
+
+<file path=ppt/slides/slide11.xml><?xml version="1.0" encoding="utf-8"?>
+<p:sld xmlns:a="http://schemas.openxmlformats.org/drawingml/2006/main" xmlns:r="http://schemas.openxmlformats.org/officeDocument/2006/relationships" xmlns:mc="http://schemas.openxmlformats.org/markup-compatibility/2006" xmlns:mv="urn:schemas-microsoft-com:mac:vml" xmlns:p="http://schemas.openxmlformats.org/presentationml/2006/main" xmlns:c="http://schemas.openxmlformats.org/drawingml/2006/chart" xmlns:dgm="http://schemas.openxmlformats.org/drawingml/2006/diagram" xmlns:o="urn:schemas-microsoft-com:office:office" xmlns:v="urn:schemas-microsoft-com:vml" xmlns:pvml="urn:schemas-microsoft-com:office:powerpoint" xmlns:com="http://schemas.openxmlformats.org/drawingml/2006/compatibility" xmlns:p14="http://schemas.microsoft.com/office/powerpoint/2010/main" xmlns:p15="http://schemas.microsoft.com/office/powerpoint/2012/main" xmlns:ahyp="http://schemas.microsoft.com/office/drawing/2018/hyperlinkcolor">
+  <p:cSld>
+    <p:spTree>
+      <p:nvGrpSpPr>
+        <p:cNvPr id="194" name="Shape 194"/>
+        <p:cNvGrpSpPr/>
+        <p:nvPr/>
+      </p:nvGrpSpPr>
+      <p:grpSpPr>
+        <a:xfrm>
+          <a:off x="0" y="0"/>
+          <a:ext cx="0" cy="0"/>
+          <a:chOff x="0" y="0"/>
+          <a:chExt cx="0" cy="0"/>
+        </a:xfrm>
+      </p:grpSpPr>
+      <p:sp>
+        <p:nvSpPr>
+          <p:cNvPr id="195" name="Google Shape;195;p35"/>
+          <p:cNvSpPr txBox="1"/>
+          <p:nvPr>
+            <p:ph type="title"/>
+          </p:nvPr>
+        </p:nvSpPr>
+        <p:spPr>
+          <a:xfrm>
+            <a:off x="411479" y="40882"/>
+            <a:ext cx="8246700" cy="808500"/>
+          </a:xfrm>
+          <a:prstGeom prst="rect">
+            <a:avLst/>
+          </a:prstGeom>
+        </p:spPr>
+        <p:txBody>
+          <a:bodyPr anchorCtr="0" anchor="t" bIns="34275" lIns="68575" spcFirstLastPara="1" rIns="68575" wrap="square" tIns="34275">
+            <a:normAutofit/>
+          </a:bodyPr>
+          <a:lstStyle/>
+          <a:p>
+            <a:pPr indent="0" lvl="0" marL="0" rtl="0" algn="l">
+              <a:spcBef>
+                <a:spcPts val="0"/>
+              </a:spcBef>
+              <a:spcAft>
+                <a:spcPts val="0"/>
+              </a:spcAft>
+              <a:buClr>
+                <a:schemeClr val="accent1"/>
+              </a:buClr>
+              <a:buSzPts val="2700"/>
+              <a:buFont typeface="Arial"/>
+              <a:buNone/>
+            </a:pPr>
+            <a:r>
+              <a:rPr lang="en"/>
+              <a:t>Charts (R Statistics): feature engineering cont…</a:t>
+            </a:r>
+            <a:endParaRPr/>
+          </a:p>
+        </p:txBody>
+      </p:sp>
+      <p:sp>
+        <p:nvSpPr>
+          <p:cNvPr id="196" name="Google Shape;196;p35"/>
+          <p:cNvSpPr txBox="1"/>
+          <p:nvPr>
+            <p:ph idx="1" type="body"/>
+          </p:nvPr>
+        </p:nvSpPr>
+        <p:spPr>
+          <a:xfrm>
+            <a:off x="4726625" y="638750"/>
+            <a:ext cx="3642300" cy="3945300"/>
+          </a:xfrm>
+          <a:prstGeom prst="rect">
+            <a:avLst/>
+          </a:prstGeom>
+        </p:spPr>
+        <p:txBody>
+          <a:bodyPr anchorCtr="0" anchor="t" bIns="34275" lIns="68575" spcFirstLastPara="1" rIns="68575" wrap="square" tIns="34275">
+            <a:normAutofit/>
+          </a:bodyPr>
+          <a:lstStyle/>
+          <a:p>
+            <a:pPr indent="0" lvl="0" marL="0" rtl="0" algn="l">
+              <a:lnSpc>
+                <a:spcPct val="110000"/>
+              </a:lnSpc>
+              <a:spcBef>
+                <a:spcPts val="0"/>
+              </a:spcBef>
+              <a:spcAft>
+                <a:spcPts val="0"/>
+              </a:spcAft>
+              <a:buNone/>
+            </a:pPr>
+            <a:r>
+              <a:rPr lang="en" sz="1100"/>
+              <a:t>Using R ‘s linear regression function, we compared deaths to the race independent variables. We can say people disability, no health insurance, and no vehicle with t-values greater than 2 is acceptable, and anything less than -2 is acceptable</a:t>
+            </a:r>
+            <a:endParaRPr sz="1100"/>
+          </a:p>
+          <a:p>
+            <a:pPr indent="0" lvl="0" marL="0" rtl="0" algn="l">
+              <a:lnSpc>
+                <a:spcPct val="110000"/>
+              </a:lnSpc>
+              <a:spcBef>
+                <a:spcPts val="0"/>
+              </a:spcBef>
+              <a:spcAft>
+                <a:spcPts val="0"/>
+              </a:spcAft>
+              <a:buNone/>
+            </a:pPr>
+            <a:r>
+              <a:t/>
+            </a:r>
+            <a:endParaRPr sz="1100"/>
+          </a:p>
+          <a:p>
+            <a:pPr indent="0" lvl="0" marL="0" rtl="0" algn="l">
+              <a:lnSpc>
+                <a:spcPct val="110000"/>
+              </a:lnSpc>
+              <a:spcBef>
+                <a:spcPts val="0"/>
+              </a:spcBef>
+              <a:spcAft>
+                <a:spcPts val="0"/>
+              </a:spcAft>
+              <a:buNone/>
+            </a:pPr>
+            <a:r>
+              <a:rPr lang="en" sz="1100"/>
+              <a:t>This model shows statistical significance with the R-Squared value of 0.9208, and a low p-value (2.2e-16). And given that the R-Squared is 92.08%, we can say that this model is effective at predicting deaths based on disability</a:t>
+            </a:r>
+            <a:endParaRPr sz="1100"/>
+          </a:p>
+          <a:p>
+            <a:pPr indent="0" lvl="0" marL="0" rtl="0" algn="l">
+              <a:lnSpc>
+                <a:spcPct val="110000"/>
+              </a:lnSpc>
+              <a:spcBef>
+                <a:spcPts val="0"/>
+              </a:spcBef>
+              <a:spcAft>
+                <a:spcPts val="0"/>
+              </a:spcAft>
+              <a:buNone/>
+            </a:pPr>
+            <a:r>
+              <a:t/>
+            </a:r>
+            <a:endParaRPr sz="1100"/>
+          </a:p>
+          <a:p>
+            <a:pPr indent="0" lvl="0" marL="0" rtl="0" algn="l">
+              <a:lnSpc>
+                <a:spcPct val="110000"/>
+              </a:lnSpc>
+              <a:spcBef>
+                <a:spcPts val="0"/>
+              </a:spcBef>
+              <a:spcAft>
+                <a:spcPts val="0"/>
+              </a:spcAft>
+              <a:buNone/>
+            </a:pPr>
+            <a:r>
+              <a:rPr b="1" lang="en" sz="1100">
+                <a:latin typeface="Open Sans"/>
+                <a:ea typeface="Open Sans"/>
+                <a:cs typeface="Open Sans"/>
+                <a:sym typeface="Open Sans"/>
+              </a:rPr>
+              <a:t>And</a:t>
+            </a:r>
+            <a:endParaRPr b="1" sz="1100">
+              <a:latin typeface="Open Sans"/>
+              <a:ea typeface="Open Sans"/>
+              <a:cs typeface="Open Sans"/>
+              <a:sym typeface="Open Sans"/>
+            </a:endParaRPr>
+          </a:p>
+          <a:p>
+            <a:pPr indent="0" lvl="0" marL="0" rtl="0" algn="l">
+              <a:lnSpc>
+                <a:spcPct val="110000"/>
+              </a:lnSpc>
+              <a:spcBef>
+                <a:spcPts val="0"/>
+              </a:spcBef>
+              <a:spcAft>
+                <a:spcPts val="0"/>
+              </a:spcAft>
+              <a:buNone/>
+            </a:pPr>
+            <a:r>
+              <a:t/>
+            </a:r>
+            <a:endParaRPr sz="1100"/>
+          </a:p>
+          <a:p>
+            <a:pPr indent="0" lvl="0" marL="0" rtl="0" algn="l">
+              <a:lnSpc>
+                <a:spcPct val="110000"/>
+              </a:lnSpc>
+              <a:spcBef>
+                <a:spcPts val="0"/>
+              </a:spcBef>
+              <a:spcAft>
+                <a:spcPts val="0"/>
+              </a:spcAft>
+              <a:buClr>
+                <a:schemeClr val="dk1"/>
+              </a:buClr>
+              <a:buSzPts val="1100"/>
+              <a:buFont typeface="Arial"/>
+              <a:buNone/>
+            </a:pPr>
+            <a:r>
+              <a:rPr lang="en" sz="1100"/>
+              <a:t>Significance with the R-Squared value of 0.8627, and a low p-value (2.2e-16). And given that the R-Squared is 86.27%, we can say that this model is effective at predicting deaths based on no health insurance and no vehicle</a:t>
+            </a:r>
+            <a:endParaRPr sz="1100"/>
+          </a:p>
+          <a:p>
+            <a:pPr indent="0" lvl="0" marL="0" rtl="0" algn="l">
+              <a:lnSpc>
+                <a:spcPct val="110000"/>
+              </a:lnSpc>
+              <a:spcBef>
+                <a:spcPts val="0"/>
+              </a:spcBef>
+              <a:spcAft>
+                <a:spcPts val="0"/>
+              </a:spcAft>
+              <a:buNone/>
+            </a:pPr>
+            <a:r>
+              <a:t/>
+            </a:r>
+            <a:endParaRPr sz="1100"/>
+          </a:p>
+          <a:p>
+            <a:pPr indent="0" lvl="0" marL="0" rtl="0" algn="l">
+              <a:lnSpc>
+                <a:spcPct val="110000"/>
+              </a:lnSpc>
+              <a:spcBef>
+                <a:spcPts val="0"/>
+              </a:spcBef>
+              <a:spcAft>
+                <a:spcPts val="0"/>
+              </a:spcAft>
+              <a:buClr>
+                <a:schemeClr val="dk1"/>
+              </a:buClr>
+              <a:buSzPts val="1500"/>
+              <a:buFont typeface="Arial"/>
+              <a:buNone/>
+            </a:pPr>
+            <a:r>
+              <a:t/>
+            </a:r>
+            <a:endParaRPr sz="1100"/>
+          </a:p>
+        </p:txBody>
+      </p:sp>
+      <p:pic>
+        <p:nvPicPr>
+          <p:cNvPr id="197" name="Google Shape;197;p35"/>
+          <p:cNvPicPr preferRelativeResize="0"/>
+          <p:nvPr/>
+        </p:nvPicPr>
+        <p:blipFill>
+          <a:blip r:embed="rId3">
+            <a:alphaModFix/>
+          </a:blip>
+          <a:stretch>
+            <a:fillRect/>
+          </a:stretch>
+        </p:blipFill>
+        <p:spPr>
+          <a:xfrm>
+            <a:off x="441500" y="598400"/>
+            <a:ext cx="3935500" cy="1973350"/>
+          </a:xfrm>
+          <a:prstGeom prst="rect">
+            <a:avLst/>
+          </a:prstGeom>
+          <a:noFill/>
+          <a:ln>
+            <a:noFill/>
+          </a:ln>
+        </p:spPr>
+      </p:pic>
+      <p:pic>
+        <p:nvPicPr>
+          <p:cNvPr id="198" name="Google Shape;198;p35"/>
+          <p:cNvPicPr preferRelativeResize="0"/>
+          <p:nvPr/>
+        </p:nvPicPr>
+        <p:blipFill>
+          <a:blip r:embed="rId4">
+            <a:alphaModFix/>
+          </a:blip>
+          <a:stretch>
+            <a:fillRect/>
+          </a:stretch>
+        </p:blipFill>
+        <p:spPr>
+          <a:xfrm>
+            <a:off x="441500" y="2709575"/>
+            <a:ext cx="4005874" cy="2026025"/>
+          </a:xfrm>
+          <a:prstGeom prst="rect">
+            <a:avLst/>
+          </a:prstGeom>
+          <a:noFill/>
+          <a:ln>
+            <a:noFill/>
+          </a:ln>
+        </p:spPr>
+      </p:pic>
+    </p:spTree>
+  </p:cSld>
+  <p:clrMapOvr>
+    <a:masterClrMapping/>
+  </p:clrMapOvr>
+</p:sld>
+</file>
+
+<file path=ppt/slides/slide12.xml><?xml version="1.0" encoding="utf-8"?>
+<p:sld xmlns:a="http://schemas.openxmlformats.org/drawingml/2006/main" xmlns:r="http://schemas.openxmlformats.org/officeDocument/2006/relationships" xmlns:mc="http://schemas.openxmlformats.org/markup-compatibility/2006" xmlns:mv="urn:schemas-microsoft-com:mac:vml" xmlns:p="http://schemas.openxmlformats.org/presentationml/2006/main" xmlns:c="http://schemas.openxmlformats.org/drawingml/2006/chart" xmlns:dgm="http://schemas.openxmlformats.org/drawingml/2006/diagram" xmlns:o="urn:schemas-microsoft-com:office:office" xmlns:v="urn:schemas-microsoft-com:vml" xmlns:pvml="urn:schemas-microsoft-com:office:powerpoint" xmlns:com="http://schemas.openxmlformats.org/drawingml/2006/compatibility" xmlns:p14="http://schemas.microsoft.com/office/powerpoint/2010/main" xmlns:p15="http://schemas.microsoft.com/office/powerpoint/2012/main" xmlns:ahyp="http://schemas.microsoft.com/office/drawing/2018/hyperlinkcolor">
+  <p:cSld>
+    <p:spTree>
+      <p:nvGrpSpPr>
+        <p:cNvPr id="202" name="Shape 202"/>
+        <p:cNvGrpSpPr/>
+        <p:nvPr/>
+      </p:nvGrpSpPr>
+      <p:grpSpPr>
+        <a:xfrm>
+          <a:off x="0" y="0"/>
+          <a:ext cx="0" cy="0"/>
+          <a:chOff x="0" y="0"/>
+          <a:chExt cx="0" cy="0"/>
+        </a:xfrm>
+      </p:grpSpPr>
+      <p:sp>
+        <p:nvSpPr>
+          <p:cNvPr id="203" name="Google Shape;203;p36"/>
+          <p:cNvSpPr txBox="1"/>
+          <p:nvPr>
+            <p:ph type="title"/>
+          </p:nvPr>
+        </p:nvSpPr>
+        <p:spPr>
+          <a:xfrm>
+            <a:off x="350975" y="26903"/>
+            <a:ext cx="8246700" cy="504300"/>
+          </a:xfrm>
+          <a:prstGeom prst="rect">
+            <a:avLst/>
+          </a:prstGeom>
+        </p:spPr>
+        <p:txBody>
+          <a:bodyPr anchorCtr="0" anchor="t" bIns="34275" lIns="68575" spcFirstLastPara="1" rIns="68575" wrap="square" tIns="34275">
+            <a:normAutofit/>
+          </a:bodyPr>
+          <a:lstStyle/>
+          <a:p>
+            <a:pPr indent="0" lvl="0" marL="0" rtl="0" algn="l">
+              <a:spcBef>
+                <a:spcPts val="0"/>
+              </a:spcBef>
+              <a:spcAft>
+                <a:spcPts val="0"/>
+              </a:spcAft>
+              <a:buClr>
+                <a:schemeClr val="dk1"/>
+              </a:buClr>
+              <a:buSzPts val="1100"/>
+              <a:buFont typeface="Arial"/>
+              <a:buNone/>
+            </a:pPr>
+            <a:r>
+              <a:rPr lang="en"/>
+              <a:t>Charts (R Statistics): feature engineering cont…</a:t>
+            </a:r>
+            <a:endParaRPr/>
+          </a:p>
+        </p:txBody>
+      </p:sp>
+      <p:pic>
+        <p:nvPicPr>
+          <p:cNvPr id="204" name="Google Shape;204;p36"/>
+          <p:cNvPicPr preferRelativeResize="0"/>
+          <p:nvPr/>
+        </p:nvPicPr>
+        <p:blipFill rotWithShape="1">
+          <a:blip r:embed="rId3">
+            <a:alphaModFix/>
+          </a:blip>
+          <a:srcRect b="-2649" l="-5870" r="5869" t="2649"/>
+          <a:stretch/>
+        </p:blipFill>
+        <p:spPr>
+          <a:xfrm>
+            <a:off x="226375" y="564825"/>
+            <a:ext cx="4157574" cy="4229051"/>
+          </a:xfrm>
+          <a:prstGeom prst="rect">
+            <a:avLst/>
+          </a:prstGeom>
+          <a:noFill/>
+          <a:ln>
+            <a:noFill/>
+          </a:ln>
+        </p:spPr>
+      </p:pic>
+    </p:spTree>
+  </p:cSld>
+  <p:clrMapOvr>
+    <a:masterClrMapping/>
+  </p:clrMapOvr>
+</p:sld>
+</file>
+
+<file path=ppt/slides/slide13.xml><?xml version="1.0" encoding="utf-8"?>
+<p:sld xmlns:a="http://schemas.openxmlformats.org/drawingml/2006/main" xmlns:r="http://schemas.openxmlformats.org/officeDocument/2006/relationships" xmlns:mc="http://schemas.openxmlformats.org/markup-compatibility/2006" xmlns:mv="urn:schemas-microsoft-com:mac:vml" xmlns:p="http://schemas.openxmlformats.org/presentationml/2006/main" xmlns:c="http://schemas.openxmlformats.org/drawingml/2006/chart" xmlns:dgm="http://schemas.openxmlformats.org/drawingml/2006/diagram" xmlns:o="urn:schemas-microsoft-com:office:office" xmlns:v="urn:schemas-microsoft-com:vml" xmlns:pvml="urn:schemas-microsoft-com:office:powerpoint" xmlns:com="http://schemas.openxmlformats.org/drawingml/2006/compatibility" xmlns:p14="http://schemas.microsoft.com/office/powerpoint/2010/main" xmlns:p15="http://schemas.microsoft.com/office/powerpoint/2012/main" xmlns:ahyp="http://schemas.microsoft.com/office/drawing/2018/hyperlinkcolor">
+  <p:cSld>
+    <p:spTree>
+      <p:nvGrpSpPr>
+        <p:cNvPr id="208" name="Shape 208"/>
+        <p:cNvGrpSpPr/>
+        <p:nvPr/>
+      </p:nvGrpSpPr>
+      <p:grpSpPr>
+        <a:xfrm>
+          <a:off x="0" y="0"/>
+          <a:ext cx="0" cy="0"/>
+          <a:chOff x="0" y="0"/>
+          <a:chExt cx="0" cy="0"/>
+        </a:xfrm>
+      </p:grpSpPr>
+      <p:sp>
+        <p:nvSpPr>
+          <p:cNvPr id="209" name="Google Shape;209;p37"/>
+          <p:cNvSpPr txBox="1"/>
+          <p:nvPr>
+            <p:ph type="title"/>
+          </p:nvPr>
+        </p:nvSpPr>
+        <p:spPr>
+          <a:xfrm>
+            <a:off x="122350" y="47052"/>
+            <a:ext cx="8246700" cy="558000"/>
+          </a:xfrm>
+          <a:prstGeom prst="rect">
+            <a:avLst/>
+          </a:prstGeom>
+        </p:spPr>
+        <p:txBody>
+          <a:bodyPr anchorCtr="0" anchor="t" bIns="34275" lIns="68575" spcFirstLastPara="1" rIns="68575" wrap="square" tIns="34275">
+            <a:normAutofit/>
+          </a:bodyPr>
+          <a:lstStyle/>
+          <a:p>
+            <a:pPr indent="0" lvl="0" marL="0" rtl="0" algn="l">
+              <a:spcBef>
+                <a:spcPts val="0"/>
+              </a:spcBef>
+              <a:spcAft>
+                <a:spcPts val="0"/>
+              </a:spcAft>
+              <a:buClr>
+                <a:schemeClr val="dk1"/>
+              </a:buClr>
+              <a:buSzPts val="1100"/>
+              <a:buFont typeface="Arial"/>
+              <a:buNone/>
+            </a:pPr>
+            <a:r>
+              <a:rPr lang="en"/>
+              <a:t>Charts (R Statistics): feature engineering cont…</a:t>
+            </a:r>
+            <a:endParaRPr/>
+          </a:p>
+        </p:txBody>
+      </p:sp>
+      <p:sp>
+        <p:nvSpPr>
+          <p:cNvPr id="210" name="Google Shape;210;p37"/>
+          <p:cNvSpPr txBox="1"/>
+          <p:nvPr>
+            <p:ph idx="1" type="body"/>
+          </p:nvPr>
+        </p:nvSpPr>
+        <p:spPr>
+          <a:xfrm>
+            <a:off x="5056103" y="739601"/>
+            <a:ext cx="3602100" cy="3804000"/>
+          </a:xfrm>
+          <a:prstGeom prst="rect">
+            <a:avLst/>
+          </a:prstGeom>
+        </p:spPr>
+        <p:txBody>
+          <a:bodyPr anchorCtr="0" anchor="t" bIns="34275" lIns="68575" spcFirstLastPara="1" rIns="68575" wrap="square" tIns="34275">
+            <a:normAutofit/>
+          </a:bodyPr>
+          <a:lstStyle/>
+          <a:p>
+            <a:pPr indent="0" lvl="0" marL="0" rtl="0" algn="l">
+              <a:spcBef>
+                <a:spcPts val="800"/>
+              </a:spcBef>
+              <a:spcAft>
+                <a:spcPts val="0"/>
+              </a:spcAft>
+              <a:buNone/>
+            </a:pPr>
+            <a:r>
+              <a:t/>
+            </a:r>
+            <a:endParaRPr/>
+          </a:p>
+        </p:txBody>
+      </p:sp>
+      <p:pic>
+        <p:nvPicPr>
+          <p:cNvPr id="211" name="Google Shape;211;p37"/>
+          <p:cNvPicPr preferRelativeResize="0"/>
+          <p:nvPr/>
+        </p:nvPicPr>
+        <p:blipFill>
+          <a:blip r:embed="rId3">
+            <a:alphaModFix/>
+          </a:blip>
+          <a:stretch>
+            <a:fillRect/>
+          </a:stretch>
+        </p:blipFill>
+        <p:spPr>
+          <a:xfrm>
+            <a:off x="570000" y="605050"/>
+            <a:ext cx="3742887" cy="3938549"/>
+          </a:xfrm>
+          <a:prstGeom prst="rect">
+            <a:avLst/>
+          </a:prstGeom>
+          <a:noFill/>
+          <a:ln>
+            <a:noFill/>
+          </a:ln>
+        </p:spPr>
+      </p:pic>
+    </p:spTree>
+  </p:cSld>
+  <p:clrMapOvr>
+    <a:masterClrMapping/>
+  </p:clrMapOvr>
+</p:sld>
+</file>
+
+<file path=ppt/slides/slide14.xml><?xml version="1.0" encoding="utf-8"?>
+<p:sld xmlns:a="http://schemas.openxmlformats.org/drawingml/2006/main" xmlns:r="http://schemas.openxmlformats.org/officeDocument/2006/relationships" xmlns:mc="http://schemas.openxmlformats.org/markup-compatibility/2006" xmlns:mv="urn:schemas-microsoft-com:mac:vml" xmlns:p="http://schemas.openxmlformats.org/presentationml/2006/main" xmlns:c="http://schemas.openxmlformats.org/drawingml/2006/chart" xmlns:dgm="http://schemas.openxmlformats.org/drawingml/2006/diagram" xmlns:o="urn:schemas-microsoft-com:office:office" xmlns:v="urn:schemas-microsoft-com:vml" xmlns:pvml="urn:schemas-microsoft-com:office:powerpoint" xmlns:com="http://schemas.openxmlformats.org/drawingml/2006/compatibility" xmlns:p14="http://schemas.microsoft.com/office/powerpoint/2010/main" xmlns:p15="http://schemas.microsoft.com/office/powerpoint/2012/main" xmlns:ahyp="http://schemas.microsoft.com/office/drawing/2018/hyperlinkcolor">
+  <p:cSld>
+    <p:spTree>
+      <p:nvGrpSpPr>
+        <p:cNvPr id="215" name="Shape 215"/>
+        <p:cNvGrpSpPr/>
+        <p:nvPr/>
+      </p:nvGrpSpPr>
+      <p:grpSpPr>
+        <a:xfrm>
+          <a:off x="0" y="0"/>
+          <a:ext cx="0" cy="0"/>
+          <a:chOff x="0" y="0"/>
+          <a:chExt cx="0" cy="0"/>
+        </a:xfrm>
+      </p:grpSpPr>
+      <p:sp>
+        <p:nvSpPr>
+          <p:cNvPr id="216" name="Google Shape;216;p38"/>
+          <p:cNvSpPr txBox="1"/>
+          <p:nvPr>
+            <p:ph type="title"/>
+          </p:nvPr>
+        </p:nvSpPr>
+        <p:spPr>
+          <a:xfrm>
             <a:off x="411479" y="713232"/>
             <a:ext cx="8246744" cy="808387"/>
           </a:xfrm>
@@ -17000,7 +18197,7 @@
             </a:pPr>
             <a:r>
               <a:rPr lang="en"/>
-              <a:t>Week 2(Analysis Phase):</a:t>
+              <a:t>Week 3: </a:t>
             </a:r>
             <a:endParaRPr/>
           </a:p>
@@ -17008,7 +18205,7 @@
       </p:sp>
       <p:sp>
         <p:nvSpPr>
-          <p:cNvPr id="189" name="Google Shape;189;p34"/>
+          <p:cNvPr id="217" name="Google Shape;217;p38"/>
           <p:cNvSpPr txBox="1"/>
           <p:nvPr>
             <p:ph idx="1" type="body"/>
@@ -17064,12 +18261,12 @@
 </p:sld>
 </file>
 
-<file path=ppt/slides/slide11.xml><?xml version="1.0" encoding="utf-8"?>
+<file path=ppt/slides/slide15.xml><?xml version="1.0" encoding="utf-8"?>
 <p:sld xmlns:a="http://schemas.openxmlformats.org/drawingml/2006/main" xmlns:r="http://schemas.openxmlformats.org/officeDocument/2006/relationships" xmlns:mc="http://schemas.openxmlformats.org/markup-compatibility/2006" xmlns:mv="urn:schemas-microsoft-com:mac:vml" xmlns:p="http://schemas.openxmlformats.org/presentationml/2006/main" xmlns:c="http://schemas.openxmlformats.org/drawingml/2006/chart" xmlns:dgm="http://schemas.openxmlformats.org/drawingml/2006/diagram" xmlns:o="urn:schemas-microsoft-com:office:office" xmlns:v="urn:schemas-microsoft-com:vml" xmlns:pvml="urn:schemas-microsoft-com:office:powerpoint" xmlns:com="http://schemas.openxmlformats.org/drawingml/2006/compatibility" xmlns:p14="http://schemas.microsoft.com/office/powerpoint/2010/main" xmlns:p15="http://schemas.microsoft.com/office/powerpoint/2012/main" xmlns:ahyp="http://schemas.microsoft.com/office/drawing/2018/hyperlinkcolor">
   <p:cSld>
     <p:spTree>
       <p:nvGrpSpPr>
-        <p:cNvPr id="193" name="Shape 193"/>
+        <p:cNvPr id="221" name="Shape 221"/>
         <p:cNvGrpSpPr/>
         <p:nvPr/>
       </p:nvGrpSpPr>
@@ -17083,7 +18280,7 @@
       </p:grpSpPr>
       <p:sp>
         <p:nvSpPr>
-          <p:cNvPr id="194" name="Google Shape;194;p35"/>
+          <p:cNvPr id="222" name="Google Shape;222;p39"/>
           <p:cNvSpPr txBox="1"/>
           <p:nvPr>
             <p:ph type="title"/>
@@ -17127,7 +18324,7 @@
             </a:pPr>
             <a:r>
               <a:rPr lang="en"/>
-              <a:t>Week 3: </a:t>
+              <a:t>Findings:</a:t>
             </a:r>
             <a:endParaRPr/>
           </a:p>
@@ -17135,7 +18332,7 @@
       </p:sp>
       <p:sp>
         <p:nvSpPr>
-          <p:cNvPr id="195" name="Google Shape;195;p35"/>
+          <p:cNvPr id="223" name="Google Shape;223;p39"/>
           <p:cNvSpPr txBox="1"/>
           <p:nvPr>
             <p:ph idx="1" type="body"/>
@@ -17191,12 +18388,12 @@
 </p:sld>
 </file>
 
-<file path=ppt/slides/slide12.xml><?xml version="1.0" encoding="utf-8"?>
+<file path=ppt/slides/slide16.xml><?xml version="1.0" encoding="utf-8"?>
 <p:sld xmlns:a="http://schemas.openxmlformats.org/drawingml/2006/main" xmlns:r="http://schemas.openxmlformats.org/officeDocument/2006/relationships" xmlns:mc="http://schemas.openxmlformats.org/markup-compatibility/2006" xmlns:mv="urn:schemas-microsoft-com:mac:vml" xmlns:p="http://schemas.openxmlformats.org/presentationml/2006/main" xmlns:c="http://schemas.openxmlformats.org/drawingml/2006/chart" xmlns:dgm="http://schemas.openxmlformats.org/drawingml/2006/diagram" xmlns:o="urn:schemas-microsoft-com:office:office" xmlns:v="urn:schemas-microsoft-com:vml" xmlns:pvml="urn:schemas-microsoft-com:office:powerpoint" xmlns:com="http://schemas.openxmlformats.org/drawingml/2006/compatibility" xmlns:p14="http://schemas.microsoft.com/office/powerpoint/2010/main" xmlns:p15="http://schemas.microsoft.com/office/powerpoint/2012/main" xmlns:ahyp="http://schemas.microsoft.com/office/drawing/2018/hyperlinkcolor">
   <p:cSld>
     <p:spTree>
       <p:nvGrpSpPr>
-        <p:cNvPr id="199" name="Shape 199"/>
+        <p:cNvPr id="227" name="Shape 227"/>
         <p:cNvGrpSpPr/>
         <p:nvPr/>
       </p:nvGrpSpPr>
@@ -17210,134 +18407,7 @@
       </p:grpSpPr>
       <p:sp>
         <p:nvSpPr>
-          <p:cNvPr id="200" name="Google Shape;200;p36"/>
-          <p:cNvSpPr txBox="1"/>
-          <p:nvPr>
-            <p:ph type="title"/>
-          </p:nvPr>
-        </p:nvSpPr>
-        <p:spPr>
-          <a:xfrm>
-            <a:off x="411479" y="713232"/>
-            <a:ext cx="8246744" cy="808387"/>
-          </a:xfrm>
-          <a:prstGeom prst="rect">
-            <a:avLst/>
-          </a:prstGeom>
-          <a:noFill/>
-          <a:ln>
-            <a:noFill/>
-          </a:ln>
-        </p:spPr>
-        <p:txBody>
-          <a:bodyPr anchorCtr="0" anchor="t" bIns="34275" lIns="68575" spcFirstLastPara="1" rIns="68575" wrap="square" tIns="34275">
-            <a:normAutofit/>
-          </a:bodyPr>
-          <a:lstStyle/>
-          <a:p>
-            <a:pPr indent="0" lvl="0" marL="0" rtl="0" algn="l">
-              <a:lnSpc>
-                <a:spcPct val="85000"/>
-              </a:lnSpc>
-              <a:spcBef>
-                <a:spcPts val="0"/>
-              </a:spcBef>
-              <a:spcAft>
-                <a:spcPts val="0"/>
-              </a:spcAft>
-              <a:buClr>
-                <a:schemeClr val="accent1"/>
-              </a:buClr>
-              <a:buSzPts val="2700"/>
-              <a:buFont typeface="Arial"/>
-              <a:buNone/>
-            </a:pPr>
-            <a:r>
-              <a:rPr lang="en"/>
-              <a:t>Findings:</a:t>
-            </a:r>
-            <a:endParaRPr/>
-          </a:p>
-        </p:txBody>
-      </p:sp>
-      <p:sp>
-        <p:nvSpPr>
-          <p:cNvPr id="201" name="Google Shape;201;p36"/>
-          <p:cNvSpPr txBox="1"/>
-          <p:nvPr>
-            <p:ph idx="1" type="body"/>
-          </p:nvPr>
-        </p:nvSpPr>
-        <p:spPr>
-          <a:xfrm>
-            <a:off x="411481" y="1521619"/>
-            <a:ext cx="8246745" cy="3021806"/>
-          </a:xfrm>
-          <a:prstGeom prst="rect">
-            <a:avLst/>
-          </a:prstGeom>
-          <a:noFill/>
-          <a:ln>
-            <a:noFill/>
-          </a:ln>
-        </p:spPr>
-        <p:txBody>
-          <a:bodyPr anchorCtr="0" anchor="t" bIns="34275" lIns="68575" spcFirstLastPara="1" rIns="68575" wrap="square" tIns="34275">
-            <a:normAutofit/>
-          </a:bodyPr>
-          <a:lstStyle/>
-          <a:p>
-            <a:pPr indent="-76200" lvl="0" marL="177800" rtl="0" algn="l">
-              <a:lnSpc>
-                <a:spcPct val="120000"/>
-              </a:lnSpc>
-              <a:spcBef>
-                <a:spcPts val="0"/>
-              </a:spcBef>
-              <a:spcAft>
-                <a:spcPts val="0"/>
-              </a:spcAft>
-              <a:buClr>
-                <a:schemeClr val="dk1"/>
-              </a:buClr>
-              <a:buSzPts val="1500"/>
-              <a:buNone/>
-            </a:pPr>
-            <a:r>
-              <a:t/>
-            </a:r>
-            <a:endParaRPr/>
-          </a:p>
-        </p:txBody>
-      </p:sp>
-    </p:spTree>
-  </p:cSld>
-  <p:clrMapOvr>
-    <a:masterClrMapping/>
-  </p:clrMapOvr>
-</p:sld>
-</file>
-
-<file path=ppt/slides/slide13.xml><?xml version="1.0" encoding="utf-8"?>
-<p:sld xmlns:a="http://schemas.openxmlformats.org/drawingml/2006/main" xmlns:r="http://schemas.openxmlformats.org/officeDocument/2006/relationships" xmlns:mc="http://schemas.openxmlformats.org/markup-compatibility/2006" xmlns:mv="urn:schemas-microsoft-com:mac:vml" xmlns:p="http://schemas.openxmlformats.org/presentationml/2006/main" xmlns:c="http://schemas.openxmlformats.org/drawingml/2006/chart" xmlns:dgm="http://schemas.openxmlformats.org/drawingml/2006/diagram" xmlns:o="urn:schemas-microsoft-com:office:office" xmlns:v="urn:schemas-microsoft-com:vml" xmlns:pvml="urn:schemas-microsoft-com:office:powerpoint" xmlns:com="http://schemas.openxmlformats.org/drawingml/2006/compatibility" xmlns:p14="http://schemas.microsoft.com/office/powerpoint/2010/main" xmlns:p15="http://schemas.microsoft.com/office/powerpoint/2012/main" xmlns:ahyp="http://schemas.microsoft.com/office/drawing/2018/hyperlinkcolor">
-  <p:cSld>
-    <p:spTree>
-      <p:nvGrpSpPr>
-        <p:cNvPr id="205" name="Shape 205"/>
-        <p:cNvGrpSpPr/>
-        <p:nvPr/>
-      </p:nvGrpSpPr>
-      <p:grpSpPr>
-        <a:xfrm>
-          <a:off x="0" y="0"/>
-          <a:ext cx="0" cy="0"/>
-          <a:chOff x="0" y="0"/>
-          <a:chExt cx="0" cy="0"/>
-        </a:xfrm>
-      </p:grpSpPr>
-      <p:sp>
-        <p:nvSpPr>
-          <p:cNvPr id="206" name="Google Shape;206;p37"/>
+          <p:cNvPr id="228" name="Google Shape;228;p40"/>
           <p:cNvSpPr txBox="1"/>
           <p:nvPr>
             <p:ph type="title"/>
@@ -17376,7 +18446,7 @@
       </p:sp>
       <p:sp>
         <p:nvSpPr>
-          <p:cNvPr id="207" name="Google Shape;207;p37"/>
+          <p:cNvPr id="229" name="Google Shape;229;p40"/>
           <p:cNvSpPr txBox="1"/>
           <p:nvPr>
             <p:ph idx="1" type="body"/>
@@ -17449,11 +18519,15 @@
         <p:spPr>
           <a:xfrm>
             <a:off x="411479" y="713232"/>
-            <a:ext cx="8246700" cy="808500"/>
+            <a:ext cx="8246744" cy="808387"/>
           </a:xfrm>
           <a:prstGeom prst="rect">
             <a:avLst/>
           </a:prstGeom>
+          <a:noFill/>
+          <a:ln>
+            <a:noFill/>
+          </a:ln>
         </p:spPr>
         <p:txBody>
           <a:bodyPr anchorCtr="0" anchor="t" bIns="34275" lIns="68575" spcFirstLastPara="1" rIns="68575" wrap="square" tIns="34275">
@@ -17462,17 +18536,25 @@
           <a:lstStyle/>
           <a:p>
             <a:pPr indent="0" lvl="0" marL="0" rtl="0" algn="l">
-              <a:spcBef>
-                <a:spcPts val="0"/>
-              </a:spcBef>
-              <a:spcAft>
-                <a:spcPts val="0"/>
-              </a:spcAft>
+              <a:lnSpc>
+                <a:spcPct val="85000"/>
+              </a:lnSpc>
+              <a:spcBef>
+                <a:spcPts val="0"/>
+              </a:spcBef>
+              <a:spcAft>
+                <a:spcPts val="0"/>
+              </a:spcAft>
+              <a:buClr>
+                <a:schemeClr val="accent1"/>
+              </a:buClr>
+              <a:buSzPts val="2700"/>
+              <a:buFont typeface="Arial"/>
               <a:buNone/>
             </a:pPr>
             <a:r>
               <a:rPr lang="en"/>
-              <a:t>So….Why Covid and The U.S. Census Breau?</a:t>
+              <a:t>Research Question: </a:t>
             </a:r>
             <a:endParaRPr/>
           </a:p>
@@ -17489,11 +18571,15 @@
         <p:spPr>
           <a:xfrm>
             <a:off x="411481" y="1521619"/>
-            <a:ext cx="8246700" cy="3021900"/>
+            <a:ext cx="8246745" cy="3021806"/>
           </a:xfrm>
           <a:prstGeom prst="rect">
             <a:avLst/>
           </a:prstGeom>
+          <a:noFill/>
+          <a:ln>
+            <a:noFill/>
+          </a:ln>
         </p:spPr>
         <p:txBody>
           <a:bodyPr anchorCtr="0" anchor="t" bIns="34275" lIns="68575" spcFirstLastPara="1" rIns="68575" wrap="square" tIns="34275">
@@ -17501,9 +18587,12 @@
           </a:bodyPr>
           <a:lstStyle/>
           <a:p>
-            <a:pPr indent="0" lvl="0" marL="0" rtl="0" algn="l">
-              <a:spcBef>
-                <a:spcPts val="800"/>
+            <a:pPr indent="0" lvl="0" marL="177800" rtl="0" algn="l">
+              <a:lnSpc>
+                <a:spcPct val="120000"/>
+              </a:lnSpc>
+              <a:spcBef>
+                <a:spcPts val="0"/>
               </a:spcBef>
               <a:spcAft>
                 <a:spcPts val="0"/>
@@ -17511,30 +18600,96 @@
               <a:buNone/>
             </a:pPr>
             <a:r>
-              <a:rPr lang="en"/>
-              <a:t>Because …. 2020 was a difficult year for everyone. . . Well maybe not for everyone. But we all </a:t>
+              <a:rPr lang="en" sz="2500">
+                <a:latin typeface="Arial"/>
+                <a:ea typeface="Arial"/>
+                <a:cs typeface="Arial"/>
+                <a:sym typeface="Arial"/>
+              </a:rPr>
+              <a:t>I</a:t>
             </a:r>
             <a:r>
-              <a:rPr lang="en"/>
-              <a:t>know</a:t>
+              <a:rPr lang="en" sz="2500">
+                <a:latin typeface="Arial"/>
+                <a:ea typeface="Arial"/>
+                <a:cs typeface="Arial"/>
+                <a:sym typeface="Arial"/>
+              </a:rPr>
+              <a:t>s the US census bureau (CRE) data with additional data from John Hopkin’s University (JHU), significant enough to be a predictive power for anticipating COVID- 19 mortalities at a state and county level</a:t>
             </a:r>
             <a:r>
-              <a:rPr lang="en"/>
-              <a:t> what happened, March of 2020. The Virus COVID -19 has taken over the globe with a wave of </a:t>
+              <a:rPr b="1" lang="en" sz="2500">
+                <a:latin typeface="Arial"/>
+                <a:ea typeface="Arial"/>
+                <a:cs typeface="Arial"/>
+                <a:sym typeface="Arial"/>
+              </a:rPr>
+              <a:t>?</a:t>
             </a:r>
+            <a:endParaRPr b="1" sz="2500">
+              <a:latin typeface="Arial"/>
+              <a:ea typeface="Arial"/>
+              <a:cs typeface="Arial"/>
+              <a:sym typeface="Arial"/>
+            </a:endParaRPr>
+          </a:p>
+          <a:p>
+            <a:pPr indent="0" lvl="0" marL="177800" rtl="0" algn="l">
+              <a:lnSpc>
+                <a:spcPct val="120000"/>
+              </a:lnSpc>
+              <a:spcBef>
+                <a:spcPts val="0"/>
+              </a:spcBef>
+              <a:spcAft>
+                <a:spcPts val="0"/>
+              </a:spcAft>
+              <a:buNone/>
+            </a:pPr>
             <a:r>
-              <a:rPr lang="en"/>
-              <a:t>devastation and m</a:t>
+              <a:rPr b="1" lang="en" sz="2500">
+                <a:latin typeface="Arial"/>
+                <a:ea typeface="Arial"/>
+                <a:cs typeface="Arial"/>
+                <a:sym typeface="Arial"/>
+              </a:rPr>
+              <a:t>											(“who knows…?”)</a:t>
             </a:r>
+            <a:endParaRPr b="1" sz="2500">
+              <a:latin typeface="Arial"/>
+              <a:ea typeface="Arial"/>
+              <a:cs typeface="Arial"/>
+              <a:sym typeface="Arial"/>
+            </a:endParaRPr>
+          </a:p>
+          <a:p>
+            <a:pPr indent="0" lvl="0" marL="177800" rtl="0" algn="l">
+              <a:lnSpc>
+                <a:spcPct val="120000"/>
+              </a:lnSpc>
+              <a:spcBef>
+                <a:spcPts val="0"/>
+              </a:spcBef>
+              <a:spcAft>
+                <a:spcPts val="0"/>
+              </a:spcAft>
+              <a:buNone/>
+            </a:pPr>
             <a:r>
-              <a:rPr lang="en"/>
-              <a:t>any lives were at stake</a:t>
+              <a:rPr b="1" lang="en" sz="2500">
+                <a:latin typeface="Arial"/>
+                <a:ea typeface="Arial"/>
+                <a:cs typeface="Arial"/>
+                <a:sym typeface="Arial"/>
+              </a:rPr>
+              <a:t>(“Only our machine learning will…”)</a:t>
             </a:r>
-            <a:r>
-              <a:rPr lang="en"/>
-              <a:t>. Confusion, fear, and uncertainty were struck into the minds of the people. Questions like, How and When will this end? Will we have a vaccination? Will the world ever be the same again? Were bouncing around…but fast forward to 2023.  Why not look into covid-19 and the CRE. We thought it would be interesting to see if machine learning can predict the mortality rate of covid-</a:t>
-            </a:r>
-            <a:endParaRPr/>
+            <a:endParaRPr b="1" sz="2500">
+              <a:latin typeface="Arial"/>
+              <a:ea typeface="Arial"/>
+              <a:cs typeface="Arial"/>
+              <a:sym typeface="Arial"/>
+            </a:endParaRPr>
           </a:p>
         </p:txBody>
       </p:sp>
@@ -17574,15 +18729,11 @@
         <p:spPr>
           <a:xfrm>
             <a:off x="411479" y="713232"/>
-            <a:ext cx="8246744" cy="808387"/>
+            <a:ext cx="8246700" cy="808500"/>
           </a:xfrm>
           <a:prstGeom prst="rect">
             <a:avLst/>
           </a:prstGeom>
-          <a:noFill/>
-          <a:ln>
-            <a:noFill/>
-          </a:ln>
         </p:spPr>
         <p:txBody>
           <a:bodyPr anchorCtr="0" anchor="t" bIns="34275" lIns="68575" spcFirstLastPara="1" rIns="68575" wrap="square" tIns="34275">
@@ -17591,25 +18742,25 @@
           <a:lstStyle/>
           <a:p>
             <a:pPr indent="0" lvl="0" marL="0" rtl="0" algn="l">
-              <a:lnSpc>
-                <a:spcPct val="85000"/>
-              </a:lnSpc>
-              <a:spcBef>
-                <a:spcPts val="0"/>
-              </a:spcBef>
-              <a:spcAft>
-                <a:spcPts val="0"/>
-              </a:spcAft>
-              <a:buClr>
-                <a:schemeClr val="accent1"/>
-              </a:buClr>
-              <a:buSzPts val="2700"/>
-              <a:buFont typeface="Arial"/>
+              <a:spcBef>
+                <a:spcPts val="0"/>
+              </a:spcBef>
+              <a:spcAft>
+                <a:spcPts val="0"/>
+              </a:spcAft>
               <a:buNone/>
             </a:pPr>
             <a:r>
               <a:rPr lang="en"/>
-              <a:t>US Census Bureau’s CRE (Community Resilience Estimates) Data: </a:t>
+              <a:t>So….Why Covid and The U.S. Census </a:t>
+            </a:r>
+            <a:r>
+              <a:rPr lang="en"/>
+              <a:t>Bureau</a:t>
+            </a:r>
+            <a:r>
+              <a:rPr lang="en"/>
+              <a:t>?</a:t>
             </a:r>
             <a:endParaRPr/>
           </a:p>
@@ -17626,173 +18777,50 @@
         <p:spPr>
           <a:xfrm>
             <a:off x="411481" y="1521619"/>
-            <a:ext cx="8246745" cy="3021806"/>
+            <a:ext cx="8246700" cy="3021900"/>
           </a:xfrm>
           <a:prstGeom prst="rect">
             <a:avLst/>
           </a:prstGeom>
-          <a:noFill/>
-          <a:ln>
-            <a:noFill/>
-          </a:ln>
         </p:spPr>
         <p:txBody>
           <a:bodyPr anchorCtr="0" anchor="t" bIns="34275" lIns="68575" spcFirstLastPara="1" rIns="68575" wrap="square" tIns="34275">
-            <a:normAutofit fontScale="92500" lnSpcReduction="20000"/>
+            <a:normAutofit/>
           </a:bodyPr>
           <a:lstStyle/>
           <a:p>
-            <a:pPr indent="-164306" lvl="0" marL="177800" rtl="0" algn="l">
-              <a:lnSpc>
-                <a:spcPct val="120000"/>
-              </a:lnSpc>
-              <a:spcBef>
-                <a:spcPts val="0"/>
-              </a:spcBef>
-              <a:spcAft>
-                <a:spcPts val="0"/>
-              </a:spcAft>
-              <a:buClr>
-                <a:schemeClr val="dk1"/>
-              </a:buClr>
-              <a:buSzPct val="100000"/>
-              <a:buChar char="•"/>
+            <a:pPr indent="0" lvl="0" marL="0" rtl="0" algn="l">
+              <a:spcBef>
+                <a:spcPts val="800"/>
+              </a:spcBef>
+              <a:spcAft>
+                <a:spcPts val="0"/>
+              </a:spcAft>
+              <a:buNone/>
             </a:pPr>
             <a:r>
               <a:rPr lang="en"/>
-              <a:t>Evaluates the capacity of individuals and households within a community to absorb , endure and recover from  external stresses of a disaster or pandemic.</a:t>
-            </a:r>
-            <a:endParaRPr/>
-          </a:p>
-          <a:p>
-            <a:pPr indent="-171132" lvl="1" marL="381000" rtl="0" algn="l">
-              <a:spcBef>
-                <a:spcPts val="400"/>
-              </a:spcBef>
-              <a:spcAft>
-                <a:spcPts val="0"/>
-              </a:spcAft>
-              <a:buSzPct val="100000"/>
-              <a:buChar char="•"/>
-            </a:pPr>
-            <a:r>
-              <a:rPr lang="en"/>
-              <a:t>Examples: extreme weather , economic collapse or a viral pandemic (covid-19)</a:t>
-            </a:r>
-            <a:endParaRPr/>
-          </a:p>
-          <a:p>
-            <a:pPr indent="-171132" lvl="0" marL="177800" rtl="0" algn="l">
-              <a:spcBef>
-                <a:spcPts val="800"/>
-              </a:spcBef>
-              <a:spcAft>
-                <a:spcPts val="0"/>
-              </a:spcAft>
-              <a:buSzPct val="93333"/>
-              <a:buChar char="•"/>
-            </a:pPr>
-            <a:r>
-              <a:rPr lang="en"/>
-              <a:t>The CRE contains data for all states and counties within the United States</a:t>
-            </a:r>
-            <a:endParaRPr/>
-          </a:p>
-          <a:p>
-            <a:pPr indent="-164306" lvl="0" marL="177800" rtl="0" algn="l">
-              <a:lnSpc>
-                <a:spcPct val="120000"/>
-              </a:lnSpc>
-              <a:spcBef>
-                <a:spcPts val="800"/>
-              </a:spcBef>
-              <a:spcAft>
-                <a:spcPts val="0"/>
-              </a:spcAft>
-              <a:buClr>
-                <a:schemeClr val="dk1"/>
-              </a:buClr>
-              <a:buSzPct val="100000"/>
-              <a:buChar char="•"/>
-            </a:pPr>
-            <a:r>
-              <a:rPr lang="en"/>
-              <a:t>The CRE also utilizes aggregated risk factor data that might help with predicted covid </a:t>
+              <a:t>Because …. 2020 was a difficult year for everyone. . . Well maybe not for everyone. But we all </a:t>
             </a:r>
             <a:r>
               <a:rPr lang="en"/>
-              <a:t>mortality</a:t>
+              <a:t>know</a:t>
             </a:r>
             <a:r>
               <a:rPr lang="en"/>
-              <a:t> rate such as zero risk, one to two risk , and three plus risk.</a:t>
+              <a:t> what happened, March of 2020. The Virus COVID -19 has taken over the globe with a wave of </a:t>
             </a:r>
-            <a:endParaRPr/>
-          </a:p>
-          <a:p>
-            <a:pPr indent="-177006" lvl="1" marL="381000" rtl="0" algn="l">
-              <a:lnSpc>
-                <a:spcPct val="120000"/>
-              </a:lnSpc>
-              <a:spcBef>
-                <a:spcPts val="800"/>
-              </a:spcBef>
-              <a:spcAft>
-                <a:spcPts val="0"/>
-              </a:spcAft>
-              <a:buClr>
-                <a:schemeClr val="dk1"/>
-              </a:buClr>
-              <a:buSzPct val="107142"/>
-              <a:buChar char="•"/>
-            </a:pPr>
             <a:r>
               <a:rPr lang="en"/>
-              <a:t>These risk factors include : Income to Poverty Ratio, SIngle or Zero Caregiver Household, Crowding, Households without Full-time Employment, Communication Barrier, Disability, No Health Insurance, Age 65+, No Vehicle Access and No Broadband Internet Access.</a:t>
+              <a:t>devastation and m</a:t>
             </a:r>
-            <a:endParaRPr/>
-          </a:p>
-          <a:p>
-            <a:pPr indent="-76200" lvl="0" marL="177800" rtl="0" algn="l">
-              <a:lnSpc>
-                <a:spcPct val="120000"/>
-              </a:lnSpc>
-              <a:spcBef>
-                <a:spcPts val="800"/>
-              </a:spcBef>
-              <a:spcAft>
-                <a:spcPts val="0"/>
-              </a:spcAft>
-              <a:buClr>
-                <a:schemeClr val="dk1"/>
-              </a:buClr>
-              <a:buSzPct val="100000"/>
-              <a:buNone/>
-            </a:pPr>
             <a:r>
-              <a:t/>
+              <a:rPr lang="en"/>
+              <a:t>any lives were at stake</a:t>
             </a:r>
-            <a:endParaRPr/>
-          </a:p>
-          <a:p>
-            <a:pPr indent="-88900" lvl="1" marL="381000" rtl="0" algn="l">
-              <a:lnSpc>
-                <a:spcPct val="120000"/>
-              </a:lnSpc>
-              <a:spcBef>
-                <a:spcPts val="400"/>
-              </a:spcBef>
-              <a:spcAft>
-                <a:spcPts val="0"/>
-              </a:spcAft>
-              <a:buClr>
-                <a:schemeClr val="dk1"/>
-              </a:buClr>
-              <a:buSzPct val="100000"/>
-              <a:buNone/>
-            </a:pPr>
             <a:r>
-              <a:t/>
+              <a:rPr lang="en"/>
+              <a:t>. Confusion, fear, and uncertainty were struck into the minds of the people. Questions like, How and When will this end? Will we have a vaccination? Will the world ever be the same again? These questions were bouncing around like unstable molecules…however, fast forward to 2023.  We decided to look into covid-19 and the CRE. We thought it would be interesting to see if machine learning can predict the mortality rate of covid-19. This insight could be very helpful for future pandemics</a:t>
             </a:r>
             <a:endParaRPr/>
           </a:p>
@@ -17834,11 +18862,15 @@
         <p:spPr>
           <a:xfrm>
             <a:off x="411479" y="713232"/>
-            <a:ext cx="8246700" cy="808500"/>
+            <a:ext cx="8246744" cy="808387"/>
           </a:xfrm>
           <a:prstGeom prst="rect">
             <a:avLst/>
           </a:prstGeom>
+          <a:noFill/>
+          <a:ln>
+            <a:noFill/>
+          </a:ln>
         </p:spPr>
         <p:txBody>
           <a:bodyPr anchorCtr="0" anchor="t" bIns="34275" lIns="68575" spcFirstLastPara="1" rIns="68575" wrap="square" tIns="34275">
@@ -17847,17 +18879,25 @@
           <a:lstStyle/>
           <a:p>
             <a:pPr indent="0" lvl="0" marL="0" rtl="0" algn="l">
-              <a:spcBef>
-                <a:spcPts val="0"/>
-              </a:spcBef>
-              <a:spcAft>
-                <a:spcPts val="0"/>
-              </a:spcAft>
+              <a:lnSpc>
+                <a:spcPct val="85000"/>
+              </a:lnSpc>
+              <a:spcBef>
+                <a:spcPts val="0"/>
+              </a:spcBef>
+              <a:spcAft>
+                <a:spcPts val="0"/>
+              </a:spcAft>
+              <a:buClr>
+                <a:schemeClr val="accent1"/>
+              </a:buClr>
+              <a:buSzPts val="2700"/>
+              <a:buFont typeface="Arial"/>
               <a:buNone/>
             </a:pPr>
             <a:r>
               <a:rPr lang="en"/>
-              <a:t>John’s Hopkins University Data:</a:t>
+              <a:t>US Census Bureau’s CRE (Community Resilience Estimates) Data: </a:t>
             </a:r>
             <a:endParaRPr/>
           </a:p>
@@ -17874,65 +18914,98 @@
         <p:spPr>
           <a:xfrm>
             <a:off x="411481" y="1521619"/>
-            <a:ext cx="8246700" cy="3021900"/>
+            <a:ext cx="8246745" cy="3021806"/>
           </a:xfrm>
           <a:prstGeom prst="rect">
             <a:avLst/>
           </a:prstGeom>
+          <a:noFill/>
+          <a:ln>
+            <a:noFill/>
+          </a:ln>
         </p:spPr>
         <p:txBody>
           <a:bodyPr anchorCtr="0" anchor="t" bIns="34275" lIns="68575" spcFirstLastPara="1" rIns="68575" wrap="square" tIns="34275">
-            <a:normAutofit/>
+            <a:normAutofit fontScale="92500" lnSpcReduction="20000"/>
           </a:bodyPr>
           <a:lstStyle/>
           <a:p>
-            <a:pPr indent="-317500" lvl="0" marL="457200" rtl="0" algn="l">
-              <a:spcBef>
-                <a:spcPts val="800"/>
-              </a:spcBef>
-              <a:spcAft>
-                <a:spcPts val="0"/>
-              </a:spcAft>
-              <a:buSzPts val="1400"/>
+            <a:pPr indent="-164306" lvl="0" marL="177800" rtl="0" algn="l">
+              <a:lnSpc>
+                <a:spcPct val="120000"/>
+              </a:lnSpc>
+              <a:spcBef>
+                <a:spcPts val="0"/>
+              </a:spcBef>
+              <a:spcAft>
+                <a:spcPts val="0"/>
+              </a:spcAft>
+              <a:buClr>
+                <a:schemeClr val="dk1"/>
+              </a:buClr>
+              <a:buSzPct val="100000"/>
               <a:buChar char="•"/>
             </a:pPr>
             <a:r>
               <a:rPr lang="en"/>
-              <a:t>This data is very helpful with gathering covid-19 raw data such as confirm cases and death for all states and counties. </a:t>
+              <a:t>The CRE, evaluates the capacity of individuals and households within a community to absorb , endure and recover from  external stresses of a disaster or pandemic.</a:t>
             </a:r>
             <a:endParaRPr/>
           </a:p>
           <a:p>
-            <a:pPr indent="-317500" lvl="0" marL="457200" rtl="0" algn="l">
-              <a:spcBef>
-                <a:spcPts val="0"/>
-              </a:spcBef>
-              <a:spcAft>
-                <a:spcPts val="0"/>
-              </a:spcAft>
-              <a:buSzPts val="1400"/>
+            <a:pPr indent="-171132" lvl="1" marL="381000" rtl="0" algn="l">
+              <a:spcBef>
+                <a:spcPts val="400"/>
+              </a:spcBef>
+              <a:spcAft>
+                <a:spcPts val="0"/>
+              </a:spcAft>
+              <a:buSzPct val="100000"/>
               <a:buChar char="•"/>
             </a:pPr>
             <a:r>
               <a:rPr lang="en"/>
-              <a:t>The covid data that were used in our data set were from dates (X) to (X)</a:t>
+              <a:t>Examples: extreme weather , economic collapse or a viral pandemic (covid-19)</a:t>
             </a:r>
             <a:endParaRPr/>
           </a:p>
           <a:p>
-            <a:pPr indent="-317500" lvl="0" marL="457200" rtl="0" algn="l">
-              <a:spcBef>
-                <a:spcPts val="0"/>
-              </a:spcBef>
-              <a:spcAft>
-                <a:spcPts val="0"/>
-              </a:spcAft>
-              <a:buSzPts val="1400"/>
+            <a:pPr indent="-171132" lvl="0" marL="177800" rtl="0" algn="l">
+              <a:spcBef>
+                <a:spcPts val="800"/>
+              </a:spcBef>
+              <a:spcAft>
+                <a:spcPts val="0"/>
+              </a:spcAft>
+              <a:buSzPct val="93333"/>
               <a:buChar char="•"/>
             </a:pPr>
             <a:r>
               <a:rPr lang="en"/>
-              <a:t>We hope this data will help us and our machine learning in predicting the covid </a:t>
+              <a:t>The CRE contains data for all states and counties within the United States</a:t>
+            </a:r>
+            <a:endParaRPr/>
+          </a:p>
+          <a:p>
+            <a:pPr indent="-164306" lvl="0" marL="177800" rtl="0" algn="l">
+              <a:lnSpc>
+                <a:spcPct val="120000"/>
+              </a:lnSpc>
+              <a:spcBef>
+                <a:spcPts val="800"/>
+              </a:spcBef>
+              <a:spcAft>
+                <a:spcPts val="0"/>
+              </a:spcAft>
+              <a:buClr>
+                <a:schemeClr val="dk1"/>
+              </a:buClr>
+              <a:buSzPct val="100000"/>
+              <a:buChar char="•"/>
+            </a:pPr>
+            <a:r>
+              <a:rPr lang="en"/>
+              <a:t>The CRE also utilizes aggregated risk factor data that might help with predicted covid </a:t>
             </a:r>
             <a:r>
               <a:rPr lang="en"/>
@@ -17940,7 +19013,74 @@
             </a:r>
             <a:r>
               <a:rPr lang="en"/>
-              <a:t> with the CRE.</a:t>
+              <a:t> rate such as zero risk, one to two risk , and three plus risk.</a:t>
+            </a:r>
+            <a:endParaRPr/>
+          </a:p>
+          <a:p>
+            <a:pPr indent="-177006" lvl="1" marL="381000" rtl="0" algn="l">
+              <a:lnSpc>
+                <a:spcPct val="120000"/>
+              </a:lnSpc>
+              <a:spcBef>
+                <a:spcPts val="800"/>
+              </a:spcBef>
+              <a:spcAft>
+                <a:spcPts val="0"/>
+              </a:spcAft>
+              <a:buClr>
+                <a:schemeClr val="dk1"/>
+              </a:buClr>
+              <a:buSzPct val="107142"/>
+              <a:buChar char="•"/>
+            </a:pPr>
+            <a:r>
+              <a:rPr lang="en"/>
+              <a:t>These risk factors include : Income to Poverty Ratio, SIngle or Zero Caregiver Household, Crowding, Households without Full-time Employment, Communication Barrier, Disability, No Health Insurance, Age 65+, No Vehicle Access and No Broadband Internet Access.</a:t>
+            </a:r>
+            <a:endParaRPr/>
+          </a:p>
+          <a:p>
+            <a:pPr indent="-76200" lvl="0" marL="177800" rtl="0" algn="l">
+              <a:lnSpc>
+                <a:spcPct val="120000"/>
+              </a:lnSpc>
+              <a:spcBef>
+                <a:spcPts val="800"/>
+              </a:spcBef>
+              <a:spcAft>
+                <a:spcPts val="0"/>
+              </a:spcAft>
+              <a:buClr>
+                <a:schemeClr val="dk1"/>
+              </a:buClr>
+              <a:buSzPct val="100000"/>
+              <a:buNone/>
+            </a:pPr>
+            <a:r>
+              <a:t/>
+            </a:r>
+            <a:endParaRPr/>
+          </a:p>
+          <a:p>
+            <a:pPr indent="-88900" lvl="1" marL="381000" rtl="0" algn="l">
+              <a:lnSpc>
+                <a:spcPct val="120000"/>
+              </a:lnSpc>
+              <a:spcBef>
+                <a:spcPts val="400"/>
+              </a:spcBef>
+              <a:spcAft>
+                <a:spcPts val="0"/>
+              </a:spcAft>
+              <a:buClr>
+                <a:schemeClr val="dk1"/>
+              </a:buClr>
+              <a:buSzPct val="100000"/>
+              <a:buNone/>
+            </a:pPr>
+            <a:r>
+              <a:t/>
             </a:r>
             <a:endParaRPr/>
           </a:p>
@@ -17982,15 +19122,11 @@
         <p:spPr>
           <a:xfrm>
             <a:off x="411479" y="713232"/>
-            <a:ext cx="8246744" cy="808387"/>
+            <a:ext cx="8246700" cy="808500"/>
           </a:xfrm>
           <a:prstGeom prst="rect">
             <a:avLst/>
           </a:prstGeom>
-          <a:noFill/>
-          <a:ln>
-            <a:noFill/>
-          </a:ln>
         </p:spPr>
         <p:txBody>
           <a:bodyPr anchorCtr="0" anchor="t" bIns="34275" lIns="68575" spcFirstLastPara="1" rIns="68575" wrap="square" tIns="34275">
@@ -17999,25 +19135,17 @@
           <a:lstStyle/>
           <a:p>
             <a:pPr indent="0" lvl="0" marL="0" rtl="0" algn="l">
-              <a:lnSpc>
-                <a:spcPct val="85000"/>
-              </a:lnSpc>
-              <a:spcBef>
-                <a:spcPts val="0"/>
-              </a:spcBef>
-              <a:spcAft>
-                <a:spcPts val="0"/>
-              </a:spcAft>
-              <a:buClr>
-                <a:schemeClr val="accent1"/>
-              </a:buClr>
-              <a:buSzPts val="2700"/>
-              <a:buFont typeface="Arial"/>
+              <a:spcBef>
+                <a:spcPts val="0"/>
+              </a:spcBef>
+              <a:spcAft>
+                <a:spcPts val="0"/>
+              </a:spcAft>
               <a:buNone/>
             </a:pPr>
             <a:r>
               <a:rPr lang="en"/>
-              <a:t>Data Description: </a:t>
+              <a:t>John’s Hopkins University (JHU) Data:</a:t>
             </a:r>
             <a:endParaRPr/>
           </a:p>
@@ -18034,15 +19162,11 @@
         <p:spPr>
           <a:xfrm>
             <a:off x="411481" y="1521619"/>
-            <a:ext cx="8246745" cy="3021806"/>
+            <a:ext cx="8246700" cy="3021900"/>
           </a:xfrm>
           <a:prstGeom prst="rect">
             <a:avLst/>
           </a:prstGeom>
-          <a:noFill/>
-          <a:ln>
-            <a:noFill/>
-          </a:ln>
         </p:spPr>
         <p:txBody>
           <a:bodyPr anchorCtr="0" anchor="t" bIns="34275" lIns="68575" spcFirstLastPara="1" rIns="68575" wrap="square" tIns="34275">
@@ -18050,94 +19174,78 @@
           </a:bodyPr>
           <a:lstStyle/>
           <a:p>
-            <a:pPr indent="-171450" lvl="0" marL="177800" rtl="0" algn="l">
-              <a:lnSpc>
-                <a:spcPct val="120000"/>
-              </a:lnSpc>
-              <a:spcBef>
-                <a:spcPts val="0"/>
-              </a:spcBef>
-              <a:spcAft>
-                <a:spcPts val="0"/>
-              </a:spcAft>
-              <a:buClr>
-                <a:schemeClr val="dk1"/>
-              </a:buClr>
-              <a:buSzPts val="1500"/>
+            <a:pPr indent="-317500" lvl="0" marL="457200" rtl="0" algn="l">
+              <a:spcBef>
+                <a:spcPts val="800"/>
+              </a:spcBef>
+              <a:spcAft>
+                <a:spcPts val="0"/>
+              </a:spcAft>
+              <a:buSzPts val="1400"/>
               <a:buChar char="•"/>
             </a:pPr>
             <a:r>
               <a:rPr lang="en"/>
-              <a:t>The data used in this analysis were provided by John’s Hopkins University which documents reported cases and deaths attributed to Covid-19 and The data from the U.S. Census Bureau’s CRE (Community Resilience Estimates)</a:t>
+              <a:t>Join Hopkins data is a resource to help the understanding of the virus, inform the public to help guide a response and save lives. </a:t>
             </a:r>
             <a:endParaRPr/>
           </a:p>
           <a:p>
-            <a:pPr indent="-171450" lvl="0" marL="177800" rtl="0" algn="l">
-              <a:lnSpc>
-                <a:spcPct val="120000"/>
-              </a:lnSpc>
-              <a:spcBef>
-                <a:spcPts val="800"/>
-              </a:spcBef>
-              <a:spcAft>
-                <a:spcPts val="0"/>
-              </a:spcAft>
-              <a:buClr>
-                <a:schemeClr val="dk1"/>
-              </a:buClr>
-              <a:buSzPts val="1500"/>
+            <a:pPr indent="-317500" lvl="0" marL="457200" rtl="0" algn="l">
+              <a:spcBef>
+                <a:spcPts val="0"/>
+              </a:spcBef>
+              <a:spcAft>
+                <a:spcPts val="0"/>
+              </a:spcAft>
+              <a:buSzPts val="1400"/>
               <a:buChar char="•"/>
             </a:pPr>
             <a:r>
               <a:rPr lang="en"/>
-              <a:t>From the John’s Hopkins Data we used the Covid-19 cases, deaths and…</a:t>
+              <a:t>This data is very helpful with gathering covid-19 raw data such as confirm cases and death for all states, counties and countries. </a:t>
             </a:r>
             <a:endParaRPr/>
           </a:p>
           <a:p>
-            <a:pPr indent="-171450" lvl="0" marL="177800" rtl="0" algn="l">
-              <a:lnSpc>
-                <a:spcPct val="120000"/>
-              </a:lnSpc>
-              <a:spcBef>
-                <a:spcPts val="800"/>
-              </a:spcBef>
-              <a:spcAft>
-                <a:spcPts val="0"/>
-              </a:spcAft>
-              <a:buClr>
-                <a:schemeClr val="dk1"/>
-              </a:buClr>
-              <a:buSzPts val="1500"/>
+            <a:pPr indent="-317500" lvl="0" marL="457200" rtl="0" algn="l">
+              <a:spcBef>
+                <a:spcPts val="0"/>
+              </a:spcBef>
+              <a:spcAft>
+                <a:spcPts val="0"/>
+              </a:spcAft>
+              <a:buSzPts val="1400"/>
               <a:buChar char="•"/>
             </a:pPr>
             <a:r>
               <a:rPr lang="en"/>
-              <a:t>From the U.S Census (CRE) we used the State/County names and Risk factors. (Zero Risk, </a:t>
+              <a:t>The covid data that were used in our data set were from start of pandemic until now</a:t>
             </a:r>
             <a:endParaRPr/>
           </a:p>
           <a:p>
-            <a:pPr indent="-171450" lvl="0" marL="177800" rtl="0" algn="l">
-              <a:lnSpc>
-                <a:spcPct val="120000"/>
-              </a:lnSpc>
-              <a:spcBef>
-                <a:spcPts val="800"/>
-              </a:spcBef>
-              <a:spcAft>
-                <a:spcPts val="0"/>
-              </a:spcAft>
-              <a:buClr>
-                <a:schemeClr val="dk1"/>
-              </a:buClr>
-              <a:buSzPts val="1500"/>
+            <a:pPr indent="-317500" lvl="0" marL="457200" rtl="0" algn="l">
+              <a:spcBef>
+                <a:spcPts val="0"/>
+              </a:spcBef>
+              <a:spcAft>
+                <a:spcPts val="0"/>
+              </a:spcAft>
+              <a:buSzPts val="1400"/>
               <a:buChar char="•"/>
             </a:pPr>
             <a:r>
               <a:rPr lang="en"/>
-              <a:t>For the purpose of this project the two data set has been cleaned and merged. (We will not go through the process of the data cleaning)</a:t>
+              <a:t>We hope this data will help us and our machine learning in predicting the covid </a:t>
+            </a:r>
+            <a:r>
+              <a:rPr lang="en"/>
+              <a:t>mortality</a:t>
+            </a:r>
+            <a:r>
+              <a:rPr lang="en"/>
+              <a:t> with the CRE.</a:t>
             </a:r>
             <a:endParaRPr/>
           </a:p>
@@ -18214,7 +19322,7 @@
             </a:pPr>
             <a:r>
               <a:rPr lang="en"/>
-              <a:t>Research Question: </a:t>
+              <a:t>Data Description: </a:t>
             </a:r>
             <a:endParaRPr/>
           </a:p>
@@ -18247,7 +19355,7 @@
           </a:bodyPr>
           <a:lstStyle/>
           <a:p>
-            <a:pPr indent="-171450" lvl="0" marL="177800" rtl="0" algn="l">
+            <a:pPr indent="-317500" lvl="0" marL="457200" rtl="0" algn="l">
               <a:lnSpc>
                 <a:spcPct val="120000"/>
               </a:lnSpc>
@@ -18257,15 +19365,72 @@
               <a:spcAft>
                 <a:spcPts val="0"/>
               </a:spcAft>
-              <a:buClr>
-                <a:schemeClr val="dk1"/>
-              </a:buClr>
-              <a:buSzPts val="1500"/>
+              <a:buSzPts val="1400"/>
               <a:buChar char="•"/>
             </a:pPr>
             <a:r>
               <a:rPr lang="en"/>
-              <a:t>The main question for this project is whether the US census bureau CRE data is significant predictive power for anticipating Covid- 9 mortalities at a county level. </a:t>
+              <a:t>The data used in this analysis were provided by John’s Hopkins University which documents reported cases and deaths attributed to Covid-19 and The data from the U.S. Census Bureau’s CRE (Community Resilience Estimates)</a:t>
+            </a:r>
+            <a:endParaRPr/>
+          </a:p>
+          <a:p>
+            <a:pPr indent="-317500" lvl="0" marL="457200" rtl="0" algn="l">
+              <a:lnSpc>
+                <a:spcPct val="120000"/>
+              </a:lnSpc>
+              <a:spcBef>
+                <a:spcPts val="0"/>
+              </a:spcBef>
+              <a:spcAft>
+                <a:spcPts val="0"/>
+              </a:spcAft>
+              <a:buSzPts val="1400"/>
+              <a:buChar char="•"/>
+            </a:pPr>
+            <a:r>
+              <a:rPr lang="en"/>
+              <a:t>From the John’s Hopkins Data we used the Covid-19 cases and deaths </a:t>
+            </a:r>
+            <a:endParaRPr/>
+          </a:p>
+          <a:p>
+            <a:pPr indent="-317500" lvl="0" marL="457200" rtl="0" algn="l">
+              <a:lnSpc>
+                <a:spcPct val="120000"/>
+              </a:lnSpc>
+              <a:spcBef>
+                <a:spcPts val="0"/>
+              </a:spcBef>
+              <a:spcAft>
+                <a:spcPts val="0"/>
+              </a:spcAft>
+              <a:buSzPts val="1400"/>
+              <a:buChar char="•"/>
+            </a:pPr>
+            <a:r>
+              <a:rPr lang="en"/>
+              <a:t>From the U.S Census (CRE) we used the State/County names, Risk factors aggregates and the many risk factors. </a:t>
+            </a:r>
+            <a:endParaRPr/>
+          </a:p>
+          <a:p>
+            <a:pPr indent="-317500" lvl="0" marL="457200" rtl="0" algn="l">
+              <a:lnSpc>
+                <a:spcPct val="120000"/>
+              </a:lnSpc>
+              <a:spcBef>
+                <a:spcPts val="0"/>
+              </a:spcBef>
+              <a:spcAft>
+                <a:spcPts val="0"/>
+              </a:spcAft>
+              <a:buSzPts val="1400"/>
+              <a:buChar char="•"/>
+            </a:pPr>
+            <a:r>
+              <a:rPr lang="en"/>
+              <a:t>For the purpose of this project the two data set has been cleaned and merged using python and SQL alchemy for DB</a:t>
             </a:r>
             <a:endParaRPr/>
           </a:p>
@@ -18358,8 +19523,8 @@
         </p:nvSpPr>
         <p:spPr>
           <a:xfrm>
-            <a:off x="411481" y="1521619"/>
-            <a:ext cx="8246745" cy="3021806"/>
+            <a:off x="411475" y="1364100"/>
+            <a:ext cx="8246700" cy="3179400"/>
           </a:xfrm>
           <a:prstGeom prst="rect">
             <a:avLst/>
@@ -18377,7 +19542,7 @@
           <a:p>
             <a:pPr indent="-317500" lvl="0" marL="457200" rtl="0" algn="l">
               <a:lnSpc>
-                <a:spcPct val="120000"/>
+                <a:spcPct val="200000"/>
               </a:lnSpc>
               <a:spcBef>
                 <a:spcPts val="0"/>
@@ -18390,14 +19555,22 @@
             </a:pPr>
             <a:r>
               <a:rPr lang="en"/>
-              <a:t>Data used in the first week were data from the CRE and John hopkins.</a:t>
+              <a:t>Data used in our project were from the US Census </a:t>
+            </a:r>
+            <a:r>
+              <a:rPr lang="en"/>
+              <a:t>Bureau</a:t>
+            </a:r>
+            <a:r>
+              <a:rPr lang="en"/>
+              <a:t> (CRE) and John hopkins covid-19. </a:t>
             </a:r>
             <a:endParaRPr/>
           </a:p>
           <a:p>
             <a:pPr indent="-317500" lvl="0" marL="457200" rtl="0" algn="l">
               <a:lnSpc>
-                <a:spcPct val="120000"/>
+                <a:spcPct val="200000"/>
               </a:lnSpc>
               <a:spcBef>
                 <a:spcPts val="0"/>
@@ -18410,7 +19583,47 @@
             </a:pPr>
             <a:r>
               <a:rPr lang="en"/>
-              <a:t>These data were merged</a:t>
+              <a:t>R statistics </a:t>
+            </a:r>
+            <a:endParaRPr/>
+          </a:p>
+          <a:p>
+            <a:pPr indent="-317500" lvl="0" marL="457200" rtl="0" algn="l">
+              <a:lnSpc>
+                <a:spcPct val="200000"/>
+              </a:lnSpc>
+              <a:spcBef>
+                <a:spcPts val="0"/>
+              </a:spcBef>
+              <a:spcAft>
+                <a:spcPts val="0"/>
+              </a:spcAft>
+              <a:buSzPts val="1400"/>
+              <a:buChar char="•"/>
+            </a:pPr>
+            <a:r>
+              <a:rPr lang="en"/>
+              <a:t>Tableau for visual charts / dashboard</a:t>
+            </a:r>
+            <a:endParaRPr/>
+          </a:p>
+          <a:p>
+            <a:pPr indent="-317500" lvl="0" marL="457200" rtl="0" algn="l">
+              <a:lnSpc>
+                <a:spcPct val="200000"/>
+              </a:lnSpc>
+              <a:spcBef>
+                <a:spcPts val="0"/>
+              </a:spcBef>
+              <a:spcAft>
+                <a:spcPts val="0"/>
+              </a:spcAft>
+              <a:buSzPts val="1400"/>
+              <a:buChar char="•"/>
+            </a:pPr>
+            <a:r>
+              <a:rPr lang="en"/>
+              <a:t>Heat maps to find correlation between variables</a:t>
             </a:r>
             <a:endParaRPr/>
           </a:p>
@@ -18451,8 +19664,56 @@
         </p:nvSpPr>
         <p:spPr>
           <a:xfrm>
-            <a:off x="411479" y="713232"/>
-            <a:ext cx="8246744" cy="808387"/>
+            <a:off x="1" y="47498"/>
+            <a:ext cx="9099600" cy="997500"/>
+          </a:xfrm>
+          <a:prstGeom prst="rect">
+            <a:avLst/>
+          </a:prstGeom>
+        </p:spPr>
+        <p:txBody>
+          <a:bodyPr anchorCtr="0" anchor="t" bIns="34275" lIns="68575" spcFirstLastPara="1" rIns="68575" wrap="square" tIns="34275">
+            <a:normAutofit/>
+          </a:bodyPr>
+          <a:lstStyle/>
+          <a:p>
+            <a:pPr indent="0" lvl="0" marL="0" rtl="0" algn="l">
+              <a:spcBef>
+                <a:spcPts val="0"/>
+              </a:spcBef>
+              <a:spcAft>
+                <a:spcPts val="0"/>
+              </a:spcAft>
+              <a:buNone/>
+            </a:pPr>
+            <a:r>
+              <a:rPr lang="en"/>
+              <a:t>Charts (Tableau): Interactive Covid Report Dashboard</a:t>
+            </a:r>
+            <a:endParaRPr/>
+          </a:p>
+        </p:txBody>
+      </p:sp>
+      <p:pic>
+        <p:nvPicPr>
+          <p:cNvPr id="177" name="Google Shape;177;p32">
+            <a:hlinkClick r:id="rId3"/>
+          </p:cNvPr>
+          <p:cNvPicPr preferRelativeResize="0"/>
+          <p:nvPr/>
+        </p:nvPicPr>
+        <p:blipFill>
+          <a:blip r:embed="rId4">
+            <a:alphaModFix/>
+          </a:blip>
+          <a:stretch>
+            <a:fillRect/>
+          </a:stretch>
+        </p:blipFill>
+        <p:spPr>
+          <a:xfrm>
+            <a:off x="0" y="450525"/>
+            <a:ext cx="9099526" cy="4461451"/>
           </a:xfrm>
           <a:prstGeom prst="rect">
             <a:avLst/>
@@ -18462,87 +19723,7 @@
             <a:noFill/>
           </a:ln>
         </p:spPr>
-        <p:txBody>
-          <a:bodyPr anchorCtr="0" anchor="t" bIns="34275" lIns="68575" spcFirstLastPara="1" rIns="68575" wrap="square" tIns="34275">
-            <a:normAutofit/>
-          </a:bodyPr>
-          <a:lstStyle/>
-          <a:p>
-            <a:pPr indent="0" lvl="0" marL="0" rtl="0" algn="l">
-              <a:lnSpc>
-                <a:spcPct val="85000"/>
-              </a:lnSpc>
-              <a:spcBef>
-                <a:spcPts val="0"/>
-              </a:spcBef>
-              <a:spcAft>
-                <a:spcPts val="0"/>
-              </a:spcAft>
-              <a:buClr>
-                <a:schemeClr val="accent1"/>
-              </a:buClr>
-              <a:buSzPts val="2700"/>
-              <a:buFont typeface="Arial"/>
-              <a:buNone/>
-            </a:pPr>
-            <a:r>
-              <a:rPr lang="en"/>
-              <a:t>Charts(R Statistics):</a:t>
-            </a:r>
-            <a:endParaRPr/>
-          </a:p>
-        </p:txBody>
-      </p:sp>
-      <p:sp>
-        <p:nvSpPr>
-          <p:cNvPr id="177" name="Google Shape;177;p32"/>
-          <p:cNvSpPr txBox="1"/>
-          <p:nvPr>
-            <p:ph idx="1" type="body"/>
-          </p:nvPr>
-        </p:nvSpPr>
-        <p:spPr>
-          <a:xfrm>
-            <a:off x="411481" y="1521619"/>
-            <a:ext cx="8246745" cy="3021806"/>
-          </a:xfrm>
-          <a:prstGeom prst="rect">
-            <a:avLst/>
-          </a:prstGeom>
-          <a:noFill/>
-          <a:ln>
-            <a:noFill/>
-          </a:ln>
-        </p:spPr>
-        <p:txBody>
-          <a:bodyPr anchorCtr="0" anchor="t" bIns="34275" lIns="68575" spcFirstLastPara="1" rIns="68575" wrap="square" tIns="34275">
-            <a:normAutofit/>
-          </a:bodyPr>
-          <a:lstStyle/>
-          <a:p>
-            <a:pPr indent="-76200" lvl="0" marL="177800" rtl="0" algn="l">
-              <a:lnSpc>
-                <a:spcPct val="120000"/>
-              </a:lnSpc>
-              <a:spcBef>
-                <a:spcPts val="0"/>
-              </a:spcBef>
-              <a:spcAft>
-                <a:spcPts val="0"/>
-              </a:spcAft>
-              <a:buClr>
-                <a:schemeClr val="dk1"/>
-              </a:buClr>
-              <a:buSzPts val="1500"/>
-              <a:buNone/>
-            </a:pPr>
-            <a:r>
-              <a:t/>
-            </a:r>
-            <a:endParaRPr/>
-          </a:p>
-        </p:txBody>
-      </p:sp>
+      </p:pic>
     </p:spTree>
   </p:cSld>
   <p:clrMapOvr>
@@ -18579,11 +19760,15 @@
         <p:spPr>
           <a:xfrm>
             <a:off x="411479" y="713232"/>
-            <a:ext cx="8246700" cy="808500"/>
+            <a:ext cx="8246744" cy="808387"/>
           </a:xfrm>
           <a:prstGeom prst="rect">
             <a:avLst/>
           </a:prstGeom>
+          <a:noFill/>
+          <a:ln>
+            <a:noFill/>
+          </a:ln>
         </p:spPr>
         <p:txBody>
           <a:bodyPr anchorCtr="0" anchor="t" bIns="34275" lIns="68575" spcFirstLastPara="1" rIns="68575" wrap="square" tIns="34275">
@@ -18592,17 +19777,25 @@
           <a:lstStyle/>
           <a:p>
             <a:pPr indent="0" lvl="0" marL="0" rtl="0" algn="l">
-              <a:spcBef>
-                <a:spcPts val="0"/>
-              </a:spcBef>
-              <a:spcAft>
-                <a:spcPts val="0"/>
-              </a:spcAft>
+              <a:lnSpc>
+                <a:spcPct val="85000"/>
+              </a:lnSpc>
+              <a:spcBef>
+                <a:spcPts val="0"/>
+              </a:spcBef>
+              <a:spcAft>
+                <a:spcPts val="0"/>
+              </a:spcAft>
+              <a:buClr>
+                <a:schemeClr val="accent1"/>
+              </a:buClr>
+              <a:buSzPts val="2700"/>
+              <a:buFont typeface="Arial"/>
               <a:buNone/>
             </a:pPr>
             <a:r>
               <a:rPr lang="en"/>
-              <a:t>Charts (Tableau):</a:t>
+              <a:t>Week 2 (Analysis Phase):</a:t>
             </a:r>
             <a:endParaRPr/>
           </a:p>
@@ -18619,11 +19812,15 @@
         <p:spPr>
           <a:xfrm>
             <a:off x="411481" y="1521619"/>
-            <a:ext cx="8246700" cy="3021900"/>
+            <a:ext cx="8246745" cy="3021806"/>
           </a:xfrm>
           <a:prstGeom prst="rect">
             <a:avLst/>
           </a:prstGeom>
+          <a:noFill/>
+          <a:ln>
+            <a:noFill/>
+          </a:ln>
         </p:spPr>
         <p:txBody>
           <a:bodyPr anchorCtr="0" anchor="t" bIns="34275" lIns="68575" spcFirstLastPara="1" rIns="68575" wrap="square" tIns="34275">
@@ -18631,13 +19828,20 @@
           </a:bodyPr>
           <a:lstStyle/>
           <a:p>
-            <a:pPr indent="0" lvl="0" marL="0" rtl="0" algn="l">
-              <a:spcBef>
-                <a:spcPts val="800"/>
-              </a:spcBef>
-              <a:spcAft>
-                <a:spcPts val="0"/>
-              </a:spcAft>
+            <a:pPr indent="-76200" lvl="0" marL="177800" rtl="0" algn="l">
+              <a:lnSpc>
+                <a:spcPct val="120000"/>
+              </a:lnSpc>
+              <a:spcBef>
+                <a:spcPts val="0"/>
+              </a:spcBef>
+              <a:spcAft>
+                <a:spcPts val="0"/>
+              </a:spcAft>
+              <a:buClr>
+                <a:schemeClr val="dk1"/>
+              </a:buClr>
+              <a:buSzPts val="1500"/>
               <a:buNone/>
             </a:pPr>
             <a:r>
@@ -18935,6 +20139,285 @@
 </file>
 
 <file path=ppt/theme/theme2.xml><?xml version="1.0" encoding="utf-8"?>
+<a:theme xmlns:a="http://schemas.openxmlformats.org/drawingml/2006/main" xmlns:r="http://schemas.openxmlformats.org/officeDocument/2006/relationships" name="TribuneVTI">
+  <a:themeElements>
+    <a:clrScheme name="AnalogousFromRegularSeedRightStep">
+      <a:dk1>
+        <a:srgbClr val="000000"/>
+      </a:dk1>
+      <a:lt1>
+        <a:srgbClr val="FFFFFF"/>
+      </a:lt1>
+      <a:dk2>
+        <a:srgbClr val="223A3D"/>
+      </a:dk2>
+      <a:lt2>
+        <a:srgbClr val="E2E8E8"/>
+      </a:lt2>
+      <a:accent1>
+        <a:srgbClr val="E73429"/>
+      </a:accent1>
+      <a:accent2>
+        <a:srgbClr val="D57117"/>
+      </a:accent2>
+      <a:accent3>
+        <a:srgbClr val="B4A420"/>
+      </a:accent3>
+      <a:accent4>
+        <a:srgbClr val="80B113"/>
+      </a:accent4>
+      <a:accent5>
+        <a:srgbClr val="4AB821"/>
+      </a:accent5>
+      <a:accent6>
+        <a:srgbClr val="14BC2C"/>
+      </a:accent6>
+      <a:hlink>
+        <a:srgbClr val="329096"/>
+      </a:hlink>
+      <a:folHlink>
+        <a:srgbClr val="7F7F7F"/>
+      </a:folHlink>
+    </a:clrScheme>
+    <a:fontScheme name="Office">
+      <a:majorFont>
+        <a:latin typeface="Arial"/>
+        <a:ea typeface=""/>
+        <a:cs typeface=""/>
+        <a:font script="Jpan" typeface="ＭＳ Ｐゴシック"/>
+        <a:font script="Hang" typeface="맑은 고딕"/>
+        <a:font script="Hans" typeface="宋体"/>
+        <a:font script="Hant" typeface="新細明體"/>
+        <a:font script="Arab" typeface="Times New Roman"/>
+        <a:font script="Hebr" typeface="Times New Roman"/>
+        <a:font script="Thai" typeface="Angsana New"/>
+        <a:font script="Ethi" typeface="Nyala"/>
+        <a:font script="Beng" typeface="Vrinda"/>
+        <a:font script="Gujr" typeface="Shruti"/>
+        <a:font script="Khmr" typeface="MoolBoran"/>
+        <a:font script="Knda" typeface="Tunga"/>
+        <a:font script="Guru" typeface="Raavi"/>
+        <a:font script="Cans" typeface="Euphemia"/>
+        <a:font script="Cher" typeface="Plantagenet Cherokee"/>
+        <a:font script="Yiii" typeface="Microsoft Yi Baiti"/>
+        <a:font script="Tibt" typeface="Microsoft Himalaya"/>
+        <a:font script="Thaa" typeface="MV Boli"/>
+        <a:font script="Deva" typeface="Mangal"/>
+        <a:font script="Telu" typeface="Gautami"/>
+        <a:font script="Taml" typeface="Latha"/>
+        <a:font script="Syrc" typeface="Estrangelo Edessa"/>
+        <a:font script="Orya" typeface="Kalinga"/>
+        <a:font script="Mlym" typeface="Kartika"/>
+        <a:font script="Laoo" typeface="DokChampa"/>
+        <a:font script="Sinh" typeface="Iskoola Pota"/>
+        <a:font script="Mong" typeface="Mongolian Baiti"/>
+        <a:font script="Viet" typeface="Times New Roman"/>
+        <a:font script="Uigh" typeface="Microsoft Uighur"/>
+        <a:font script="Geor" typeface="Sylfaen"/>
+      </a:majorFont>
+      <a:minorFont>
+        <a:latin typeface="Arial"/>
+        <a:ea typeface=""/>
+        <a:cs typeface=""/>
+        <a:font script="Jpan" typeface="ＭＳ Ｐゴシック"/>
+        <a:font script="Hang" typeface="맑은 고딕"/>
+        <a:font script="Hans" typeface="宋体"/>
+        <a:font script="Hant" typeface="新細明體"/>
+        <a:font script="Arab" typeface="Arial"/>
+        <a:font script="Hebr" typeface="Arial"/>
+        <a:font script="Thai" typeface="Cordia New"/>
+        <a:font script="Ethi" typeface="Nyala"/>
+        <a:font script="Beng" typeface="Vrinda"/>
+        <a:font script="Gujr" typeface="Shruti"/>
+        <a:font script="Khmr" typeface="DaunPenh"/>
+        <a:font script="Knda" typeface="Tunga"/>
+        <a:font script="Guru" typeface="Raavi"/>
+        <a:font script="Cans" typeface="Euphemia"/>
+        <a:font script="Cher" typeface="Plantagenet Cherokee"/>
+        <a:font script="Yiii" typeface="Microsoft Yi Baiti"/>
+        <a:font script="Tibt" typeface="Microsoft Himalaya"/>
+        <a:font script="Thaa" typeface="MV Boli"/>
+        <a:font script="Deva" typeface="Mangal"/>
+        <a:font script="Telu" typeface="Gautami"/>
+        <a:font script="Taml" typeface="Latha"/>
+        <a:font script="Syrc" typeface="Estrangelo Edessa"/>
+        <a:font script="Orya" typeface="Kalinga"/>
+        <a:font script="Mlym" typeface="Kartika"/>
+        <a:font script="Laoo" typeface="DokChampa"/>
+        <a:font script="Sinh" typeface="Iskoola Pota"/>
+        <a:font script="Mong" typeface="Mongolian Baiti"/>
+        <a:font script="Viet" typeface="Arial"/>
+        <a:font script="Uigh" typeface="Microsoft Uighur"/>
+        <a:font script="Geor" typeface="Sylfaen"/>
+      </a:minorFont>
+    </a:fontScheme>
+    <a:fmtScheme name="Office">
+      <a:fillStyleLst>
+        <a:solidFill>
+          <a:schemeClr val="phClr"/>
+        </a:solidFill>
+        <a:gradFill rotWithShape="1">
+          <a:gsLst>
+            <a:gs pos="0">
+              <a:schemeClr val="phClr">
+                <a:tint val="50000"/>
+                <a:satMod val="300000"/>
+              </a:schemeClr>
+            </a:gs>
+            <a:gs pos="35000">
+              <a:schemeClr val="phClr">
+                <a:tint val="37000"/>
+                <a:satMod val="300000"/>
+              </a:schemeClr>
+            </a:gs>
+            <a:gs pos="100000">
+              <a:schemeClr val="phClr">
+                <a:tint val="15000"/>
+                <a:satMod val="350000"/>
+              </a:schemeClr>
+            </a:gs>
+          </a:gsLst>
+          <a:lin ang="16200000" scaled="1"/>
+        </a:gradFill>
+        <a:gradFill rotWithShape="1">
+          <a:gsLst>
+            <a:gs pos="0">
+              <a:schemeClr val="phClr">
+                <a:tint val="100000"/>
+                <a:shade val="100000"/>
+                <a:satMod val="130000"/>
+              </a:schemeClr>
+            </a:gs>
+            <a:gs pos="100000">
+              <a:schemeClr val="phClr">
+                <a:tint val="50000"/>
+                <a:shade val="100000"/>
+                <a:satMod val="350000"/>
+              </a:schemeClr>
+            </a:gs>
+          </a:gsLst>
+          <a:lin ang="16200000" scaled="0"/>
+        </a:gradFill>
+      </a:fillStyleLst>
+      <a:lnStyleLst>
+        <a:ln w="9525" cap="flat" cmpd="sng" algn="ctr">
+          <a:solidFill>
+            <a:schemeClr val="phClr">
+              <a:shade val="95000"/>
+              <a:satMod val="105000"/>
+            </a:schemeClr>
+          </a:solidFill>
+          <a:prstDash val="solid"/>
+        </a:ln>
+        <a:ln w="25400" cap="flat" cmpd="sng" algn="ctr">
+          <a:solidFill>
+            <a:schemeClr val="phClr"/>
+          </a:solidFill>
+          <a:prstDash val="solid"/>
+        </a:ln>
+        <a:ln w="38100" cap="flat" cmpd="sng" algn="ctr">
+          <a:solidFill>
+            <a:schemeClr val="phClr"/>
+          </a:solidFill>
+          <a:prstDash val="solid"/>
+        </a:ln>
+      </a:lnStyleLst>
+      <a:effectStyleLst>
+        <a:effectStyle>
+          <a:effectLst>
+            <a:outerShdw blurRad="40000" dist="20000" dir="5400000" rotWithShape="0">
+              <a:srgbClr val="000000">
+                <a:alpha val="38000"/>
+              </a:srgbClr>
+            </a:outerShdw>
+          </a:effectLst>
+        </a:effectStyle>
+        <a:effectStyle>
+          <a:effectLst>
+            <a:outerShdw blurRad="40000" dist="23000" dir="5400000" rotWithShape="0">
+              <a:srgbClr val="000000">
+                <a:alpha val="35000"/>
+              </a:srgbClr>
+            </a:outerShdw>
+          </a:effectLst>
+        </a:effectStyle>
+        <a:effectStyle>
+          <a:effectLst>
+            <a:outerShdw blurRad="40000" dist="23000" dir="5400000" rotWithShape="0">
+              <a:srgbClr val="000000">
+                <a:alpha val="35000"/>
+              </a:srgbClr>
+            </a:outerShdw>
+          </a:effectLst>
+          <a:scene3d>
+            <a:camera prst="orthographicFront">
+              <a:rot lat="0" lon="0" rev="0"/>
+            </a:camera>
+            <a:lightRig rig="threePt" dir="t">
+              <a:rot lat="0" lon="0" rev="1200000"/>
+            </a:lightRig>
+          </a:scene3d>
+          <a:sp3d>
+            <a:bevelT w="63500" h="25400"/>
+          </a:sp3d>
+        </a:effectStyle>
+      </a:effectStyleLst>
+      <a:bgFillStyleLst>
+        <a:solidFill>
+          <a:schemeClr val="phClr"/>
+        </a:solidFill>
+        <a:gradFill rotWithShape="1">
+          <a:gsLst>
+            <a:gs pos="0">
+              <a:schemeClr val="phClr">
+                <a:tint val="40000"/>
+                <a:satMod val="350000"/>
+              </a:schemeClr>
+            </a:gs>
+            <a:gs pos="40000">
+              <a:schemeClr val="phClr">
+                <a:tint val="45000"/>
+                <a:shade val="99000"/>
+                <a:satMod val="350000"/>
+              </a:schemeClr>
+            </a:gs>
+            <a:gs pos="100000">
+              <a:schemeClr val="phClr">
+                <a:shade val="20000"/>
+                <a:satMod val="255000"/>
+              </a:schemeClr>
+            </a:gs>
+          </a:gsLst>
+          <a:path path="circle">
+            <a:fillToRect l="50000" t="-80000" r="50000" b="180000"/>
+          </a:path>
+        </a:gradFill>
+        <a:gradFill rotWithShape="1">
+          <a:gsLst>
+            <a:gs pos="0">
+              <a:schemeClr val="phClr">
+                <a:tint val="80000"/>
+                <a:satMod val="300000"/>
+              </a:schemeClr>
+            </a:gs>
+            <a:gs pos="100000">
+              <a:schemeClr val="phClr">
+                <a:shade val="30000"/>
+                <a:satMod val="200000"/>
+              </a:schemeClr>
+            </a:gs>
+          </a:gsLst>
+          <a:path path="circle">
+            <a:fillToRect l="50000" t="50000" r="50000" b="50000"/>
+          </a:path>
+        </a:gradFill>
+      </a:bgFillStyleLst>
+    </a:fmtScheme>
+  </a:themeElements>
+</a:theme>
+</file>
+
+<file path=ppt/theme/theme3.xml><?xml version="1.0" encoding="utf-8"?>
 <a:theme xmlns:a="http://schemas.openxmlformats.org/drawingml/2006/main" xmlns:r="http://schemas.openxmlformats.org/officeDocument/2006/relationships">
   <a:themeElements>
     <a:clrScheme name="Default">
@@ -19211,283 +20694,4 @@
     </a:fmtScheme>
   </a:themeElements>
 </a:theme>
-</file>
-
-<file path=ppt/theme/theme3.xml><?xml version="1.0" encoding="utf-8"?>
-<a:theme xmlns:a="http://schemas.openxmlformats.org/drawingml/2006/main" xmlns:r="http://schemas.openxmlformats.org/officeDocument/2006/relationships" name="TribuneVTI">
-  <a:themeElements>
-    <a:clrScheme name="AnalogousFromRegularSeedRightStep">
-      <a:dk1>
-        <a:srgbClr val="000000"/>
-      </a:dk1>
-      <a:lt1>
-        <a:srgbClr val="FFFFFF"/>
-      </a:lt1>
-      <a:dk2>
-        <a:srgbClr val="223A3D"/>
-      </a:dk2>
-      <a:lt2>
-        <a:srgbClr val="E2E8E8"/>
-      </a:lt2>
-      <a:accent1>
-        <a:srgbClr val="E73429"/>
-      </a:accent1>
-      <a:accent2>
-        <a:srgbClr val="D57117"/>
-      </a:accent2>
-      <a:accent3>
-        <a:srgbClr val="B4A420"/>
-      </a:accent3>
-      <a:accent4>
-        <a:srgbClr val="80B113"/>
-      </a:accent4>
-      <a:accent5>
-        <a:srgbClr val="4AB821"/>
-      </a:accent5>
-      <a:accent6>
-        <a:srgbClr val="14BC2C"/>
-      </a:accent6>
-      <a:hlink>
-        <a:srgbClr val="329096"/>
-      </a:hlink>
-      <a:folHlink>
-        <a:srgbClr val="7F7F7F"/>
-      </a:folHlink>
-    </a:clrScheme>
-    <a:fontScheme name="Office">
-      <a:majorFont>
-        <a:latin typeface="Arial"/>
-        <a:ea typeface=""/>
-        <a:cs typeface=""/>
-        <a:font script="Jpan" typeface="ＭＳ Ｐゴシック"/>
-        <a:font script="Hang" typeface="맑은 고딕"/>
-        <a:font script="Hans" typeface="宋体"/>
-        <a:font script="Hant" typeface="新細明體"/>
-        <a:font script="Arab" typeface="Times New Roman"/>
-        <a:font script="Hebr" typeface="Times New Roman"/>
-        <a:font script="Thai" typeface="Angsana New"/>
-        <a:font script="Ethi" typeface="Nyala"/>
-        <a:font script="Beng" typeface="Vrinda"/>
-        <a:font script="Gujr" typeface="Shruti"/>
-        <a:font script="Khmr" typeface="MoolBoran"/>
-        <a:font script="Knda" typeface="Tunga"/>
-        <a:font script="Guru" typeface="Raavi"/>
-        <a:font script="Cans" typeface="Euphemia"/>
-        <a:font script="Cher" typeface="Plantagenet Cherokee"/>
-        <a:font script="Yiii" typeface="Microsoft Yi Baiti"/>
-        <a:font script="Tibt" typeface="Microsoft Himalaya"/>
-        <a:font script="Thaa" typeface="MV Boli"/>
-        <a:font script="Deva" typeface="Mangal"/>
-        <a:font script="Telu" typeface="Gautami"/>
-        <a:font script="Taml" typeface="Latha"/>
-        <a:font script="Syrc" typeface="Estrangelo Edessa"/>
-        <a:font script="Orya" typeface="Kalinga"/>
-        <a:font script="Mlym" typeface="Kartika"/>
-        <a:font script="Laoo" typeface="DokChampa"/>
-        <a:font script="Sinh" typeface="Iskoola Pota"/>
-        <a:font script="Mong" typeface="Mongolian Baiti"/>
-        <a:font script="Viet" typeface="Times New Roman"/>
-        <a:font script="Uigh" typeface="Microsoft Uighur"/>
-        <a:font script="Geor" typeface="Sylfaen"/>
-      </a:majorFont>
-      <a:minorFont>
-        <a:latin typeface="Arial"/>
-        <a:ea typeface=""/>
-        <a:cs typeface=""/>
-        <a:font script="Jpan" typeface="ＭＳ Ｐゴシック"/>
-        <a:font script="Hang" typeface="맑은 고딕"/>
-        <a:font script="Hans" typeface="宋体"/>
-        <a:font script="Hant" typeface="新細明體"/>
-        <a:font script="Arab" typeface="Arial"/>
-        <a:font script="Hebr" typeface="Arial"/>
-        <a:font script="Thai" typeface="Cordia New"/>
-        <a:font script="Ethi" typeface="Nyala"/>
-        <a:font script="Beng" typeface="Vrinda"/>
-        <a:font script="Gujr" typeface="Shruti"/>
-        <a:font script="Khmr" typeface="DaunPenh"/>
-        <a:font script="Knda" typeface="Tunga"/>
-        <a:font script="Guru" typeface="Raavi"/>
-        <a:font script="Cans" typeface="Euphemia"/>
-        <a:font script="Cher" typeface="Plantagenet Cherokee"/>
-        <a:font script="Yiii" typeface="Microsoft Yi Baiti"/>
-        <a:font script="Tibt" typeface="Microsoft Himalaya"/>
-        <a:font script="Thaa" typeface="MV Boli"/>
-        <a:font script="Deva" typeface="Mangal"/>
-        <a:font script="Telu" typeface="Gautami"/>
-        <a:font script="Taml" typeface="Latha"/>
-        <a:font script="Syrc" typeface="Estrangelo Edessa"/>
-        <a:font script="Orya" typeface="Kalinga"/>
-        <a:font script="Mlym" typeface="Kartika"/>
-        <a:font script="Laoo" typeface="DokChampa"/>
-        <a:font script="Sinh" typeface="Iskoola Pota"/>
-        <a:font script="Mong" typeface="Mongolian Baiti"/>
-        <a:font script="Viet" typeface="Arial"/>
-        <a:font script="Uigh" typeface="Microsoft Uighur"/>
-        <a:font script="Geor" typeface="Sylfaen"/>
-      </a:minorFont>
-    </a:fontScheme>
-    <a:fmtScheme name="Office">
-      <a:fillStyleLst>
-        <a:solidFill>
-          <a:schemeClr val="phClr"/>
-        </a:solidFill>
-        <a:gradFill rotWithShape="1">
-          <a:gsLst>
-            <a:gs pos="0">
-              <a:schemeClr val="phClr">
-                <a:tint val="50000"/>
-                <a:satMod val="300000"/>
-              </a:schemeClr>
-            </a:gs>
-            <a:gs pos="35000">
-              <a:schemeClr val="phClr">
-                <a:tint val="37000"/>
-                <a:satMod val="300000"/>
-              </a:schemeClr>
-            </a:gs>
-            <a:gs pos="100000">
-              <a:schemeClr val="phClr">
-                <a:tint val="15000"/>
-                <a:satMod val="350000"/>
-              </a:schemeClr>
-            </a:gs>
-          </a:gsLst>
-          <a:lin ang="16200000" scaled="1"/>
-        </a:gradFill>
-        <a:gradFill rotWithShape="1">
-          <a:gsLst>
-            <a:gs pos="0">
-              <a:schemeClr val="phClr">
-                <a:tint val="100000"/>
-                <a:shade val="100000"/>
-                <a:satMod val="130000"/>
-              </a:schemeClr>
-            </a:gs>
-            <a:gs pos="100000">
-              <a:schemeClr val="phClr">
-                <a:tint val="50000"/>
-                <a:shade val="100000"/>
-                <a:satMod val="350000"/>
-              </a:schemeClr>
-            </a:gs>
-          </a:gsLst>
-          <a:lin ang="16200000" scaled="0"/>
-        </a:gradFill>
-      </a:fillStyleLst>
-      <a:lnStyleLst>
-        <a:ln w="9525" cap="flat" cmpd="sng" algn="ctr">
-          <a:solidFill>
-            <a:schemeClr val="phClr">
-              <a:shade val="95000"/>
-              <a:satMod val="105000"/>
-            </a:schemeClr>
-          </a:solidFill>
-          <a:prstDash val="solid"/>
-        </a:ln>
-        <a:ln w="25400" cap="flat" cmpd="sng" algn="ctr">
-          <a:solidFill>
-            <a:schemeClr val="phClr"/>
-          </a:solidFill>
-          <a:prstDash val="solid"/>
-        </a:ln>
-        <a:ln w="38100" cap="flat" cmpd="sng" algn="ctr">
-          <a:solidFill>
-            <a:schemeClr val="phClr"/>
-          </a:solidFill>
-          <a:prstDash val="solid"/>
-        </a:ln>
-      </a:lnStyleLst>
-      <a:effectStyleLst>
-        <a:effectStyle>
-          <a:effectLst>
-            <a:outerShdw blurRad="40000" dist="20000" dir="5400000" rotWithShape="0">
-              <a:srgbClr val="000000">
-                <a:alpha val="38000"/>
-              </a:srgbClr>
-            </a:outerShdw>
-          </a:effectLst>
-        </a:effectStyle>
-        <a:effectStyle>
-          <a:effectLst>
-            <a:outerShdw blurRad="40000" dist="23000" dir="5400000" rotWithShape="0">
-              <a:srgbClr val="000000">
-                <a:alpha val="35000"/>
-              </a:srgbClr>
-            </a:outerShdw>
-          </a:effectLst>
-        </a:effectStyle>
-        <a:effectStyle>
-          <a:effectLst>
-            <a:outerShdw blurRad="40000" dist="23000" dir="5400000" rotWithShape="0">
-              <a:srgbClr val="000000">
-                <a:alpha val="35000"/>
-              </a:srgbClr>
-            </a:outerShdw>
-          </a:effectLst>
-          <a:scene3d>
-            <a:camera prst="orthographicFront">
-              <a:rot lat="0" lon="0" rev="0"/>
-            </a:camera>
-            <a:lightRig rig="threePt" dir="t">
-              <a:rot lat="0" lon="0" rev="1200000"/>
-            </a:lightRig>
-          </a:scene3d>
-          <a:sp3d>
-            <a:bevelT w="63500" h="25400"/>
-          </a:sp3d>
-        </a:effectStyle>
-      </a:effectStyleLst>
-      <a:bgFillStyleLst>
-        <a:solidFill>
-          <a:schemeClr val="phClr"/>
-        </a:solidFill>
-        <a:gradFill rotWithShape="1">
-          <a:gsLst>
-            <a:gs pos="0">
-              <a:schemeClr val="phClr">
-                <a:tint val="40000"/>
-                <a:satMod val="350000"/>
-              </a:schemeClr>
-            </a:gs>
-            <a:gs pos="40000">
-              <a:schemeClr val="phClr">
-                <a:tint val="45000"/>
-                <a:shade val="99000"/>
-                <a:satMod val="350000"/>
-              </a:schemeClr>
-            </a:gs>
-            <a:gs pos="100000">
-              <a:schemeClr val="phClr">
-                <a:shade val="20000"/>
-                <a:satMod val="255000"/>
-              </a:schemeClr>
-            </a:gs>
-          </a:gsLst>
-          <a:path path="circle">
-            <a:fillToRect l="50000" t="-80000" r="50000" b="180000"/>
-          </a:path>
-        </a:gradFill>
-        <a:gradFill rotWithShape="1">
-          <a:gsLst>
-            <a:gs pos="0">
-              <a:schemeClr val="phClr">
-                <a:tint val="80000"/>
-                <a:satMod val="300000"/>
-              </a:schemeClr>
-            </a:gs>
-            <a:gs pos="100000">
-              <a:schemeClr val="phClr">
-                <a:shade val="30000"/>
-                <a:satMod val="200000"/>
-              </a:schemeClr>
-            </a:gs>
-          </a:gsLst>
-          <a:path path="circle">
-            <a:fillToRect l="50000" t="50000" r="50000" b="50000"/>
-          </a:path>
-        </a:gradFill>
-      </a:bgFillStyleLst>
-    </a:fmtScheme>
-  </a:themeElements>
-</a:theme>
 </file>
</xml_diff>